<commit_message>
Finished Responsibility Driven Design
</commit_message>
<xml_diff>
--- a/se/slides/03_ResponseabilityDrivenDesign.pptx
+++ b/se/slides/03_ResponseabilityDrivenDesign.pptx
@@ -40,8 +40,8 @@
     <p:sldId id="317" r:id="rId28"/>
     <p:sldId id="316" r:id="rId29"/>
     <p:sldId id="284" r:id="rId30"/>
-    <p:sldId id="285" r:id="rId31"/>
-    <p:sldId id="286" r:id="rId32"/>
+    <p:sldId id="286" r:id="rId31"/>
+    <p:sldId id="285" r:id="rId32"/>
     <p:sldId id="287" r:id="rId33"/>
     <p:sldId id="288" r:id="rId34"/>
     <p:sldId id="289" r:id="rId35"/>
@@ -3557,13 +3557,19 @@
             <a:pPr defTabSz="914400" eaLnBrk="1" hangingPunct="1"/>
             <a:r>
               <a:rPr lang="de-DE" baseline="0" dirty="0" smtClean="0"/>
-              <a:t>Aus Sicht der Bibliothek und aus Sicht des </a:t>
-            </a:r>
-            <a:r>
-              <a:rPr lang="de-DE" baseline="0" smtClean="0"/>
-              <a:t>Buches betrachten</a:t>
-            </a:r>
+              <a:t>Aus Sicht der Bibliothek und aus Sicht des Buches betrachten</a:t>
+            </a:r>
+          </a:p>
+          <a:p>
+            <a:pPr defTabSz="914400" eaLnBrk="1" hangingPunct="1"/>
             <a:endParaRPr lang="de-DE" baseline="0" dirty="0" smtClean="0"/>
+          </a:p>
+          <a:p>
+            <a:pPr defTabSz="914400" eaLnBrk="1" hangingPunct="1"/>
+            <a:r>
+              <a:rPr lang="de-DE" baseline="0" dirty="0" smtClean="0"/>
+              <a:t>Es kann natürlich Widersprüche geben, aber diese beiden Regeln sind immer eine erste Entscheidungshilfe; dann kann man das weiter aufteilen</a:t>
+            </a:r>
           </a:p>
         </p:txBody>
       </p:sp>
@@ -3609,7 +3615,7 @@
           <a:bodyPr/>
           <a:lstStyle/>
           <a:p>
-            <a:fld id="{4FFCEB18-F25F-4D50-B669-C43CCA05877B}" type="slidenum">
+            <a:fld id="{165E673C-309A-4F60-B3D3-AB7A4D257D41}" type="slidenum">
               <a:rPr lang="en-GB"/>
               <a:pPr/>
               <a:t>30</a:t>
@@ -3620,7 +3626,7 @@
       </p:sp>
       <p:sp>
         <p:nvSpPr>
-          <p:cNvPr id="538626" name="Rectangle 2"/>
+          <p:cNvPr id="540674" name="Rectangle 2"/>
           <p:cNvSpPr>
             <a:spLocks noGrp="1" noRot="1" noChangeAspect="1" noChangeArrowheads="1" noTextEdit="1"/>
           </p:cNvSpPr>
@@ -3633,11 +3639,14 @@
             <a:off x="381000" y="685800"/>
             <a:ext cx="6096000" cy="3429000"/>
           </a:xfrm>
+          <a:solidFill>
+            <a:srgbClr val="FFFFFF"/>
+          </a:solidFill>
         </p:spPr>
       </p:sp>
       <p:sp>
         <p:nvSpPr>
-          <p:cNvPr id="538627" name="Rectangle 3"/>
+          <p:cNvPr id="540675" name="Rectangle 3"/>
           <p:cNvSpPr>
             <a:spLocks noGrp="1" noChangeArrowheads="1"/>
           </p:cNvSpPr>
@@ -3650,14 +3659,27 @@
             <a:off x="914400" y="4343400"/>
             <a:ext cx="5029200" cy="4114800"/>
           </a:xfrm>
-          <a:noFill/>
+          <a:solidFill>
+            <a:srgbClr val="FFFFFF"/>
+          </a:solidFill>
+          <a:ln>
+            <a:solidFill>
+              <a:srgbClr val="000000"/>
+            </a:solidFill>
+            <a:round/>
+            <a:headEnd/>
+            <a:tailEnd/>
+          </a:ln>
         </p:spPr>
         <p:txBody>
           <a:bodyPr lIns="91440" tIns="45720" rIns="91440" bIns="45720"/>
           <a:lstStyle/>
           <a:p>
             <a:pPr defTabSz="914400" eaLnBrk="1" hangingPunct="1"/>
-            <a:endParaRPr lang="en-US"/>
+            <a:r>
+              <a:rPr lang="en-US" dirty="0"/>
+              <a:t>A Drawing Editor knows when the drawing has changed; the Drawing knows which elements to display; each Drawing Element knows how and where its presentation should be drawn ...</a:t>
+            </a:r>
           </a:p>
         </p:txBody>
       </p:sp>
@@ -3859,7 +3881,7 @@
           <a:bodyPr/>
           <a:lstStyle/>
           <a:p>
-            <a:fld id="{165E673C-309A-4F60-B3D3-AB7A4D257D41}" type="slidenum">
+            <a:fld id="{4FFCEB18-F25F-4D50-B669-C43CCA05877B}" type="slidenum">
               <a:rPr lang="en-GB"/>
               <a:pPr/>
               <a:t>31</a:t>
@@ -3870,7 +3892,7 @@
       </p:sp>
       <p:sp>
         <p:nvSpPr>
-          <p:cNvPr id="540674" name="Rectangle 2"/>
+          <p:cNvPr id="538626" name="Rectangle 2"/>
           <p:cNvSpPr>
             <a:spLocks noGrp="1" noRot="1" noChangeAspect="1" noChangeArrowheads="1" noTextEdit="1"/>
           </p:cNvSpPr>
@@ -3883,14 +3905,11 @@
             <a:off x="381000" y="685800"/>
             <a:ext cx="6096000" cy="3429000"/>
           </a:xfrm>
-          <a:solidFill>
-            <a:srgbClr val="FFFFFF"/>
-          </a:solidFill>
         </p:spPr>
       </p:sp>
       <p:sp>
         <p:nvSpPr>
-          <p:cNvPr id="540675" name="Rectangle 3"/>
+          <p:cNvPr id="538627" name="Rectangle 3"/>
           <p:cNvSpPr>
             <a:spLocks noGrp="1" noChangeArrowheads="1"/>
           </p:cNvSpPr>
@@ -3903,17 +3922,7 @@
             <a:off x="914400" y="4343400"/>
             <a:ext cx="5029200" cy="4114800"/>
           </a:xfrm>
-          <a:solidFill>
-            <a:srgbClr val="FFFFFF"/>
-          </a:solidFill>
-          <a:ln>
-            <a:solidFill>
-              <a:srgbClr val="000000"/>
-            </a:solidFill>
-            <a:round/>
-            <a:headEnd/>
-            <a:tailEnd/>
-          </a:ln>
+          <a:noFill/>
         </p:spPr>
         <p:txBody>
           <a:bodyPr lIns="91440" tIns="45720" rIns="91440" bIns="45720"/>
@@ -3921,9 +3930,14 @@
           <a:p>
             <a:pPr defTabSz="914400" eaLnBrk="1" hangingPunct="1"/>
             <a:r>
-              <a:rPr lang="en-US"/>
-              <a:t>A Drawing Editor knows when the drawing has changed; the Drawing knows which elements to display; each Drawing Element knows how and where its presentation should be drawn ...</a:t>
-            </a:r>
+              <a:rPr lang="de-DE" dirty="0" smtClean="0"/>
+              <a:t>Wenn</a:t>
+            </a:r>
+            <a:r>
+              <a:rPr lang="de-DE" baseline="0" dirty="0" smtClean="0"/>
+              <a:t> Systeme größer werden, werden Verantwortlichkeiten größer, und die sollten dann auch aufgeteilt werden; ein Objekt das Dutzende Verantwortlichkeiten verwaltet ist viel zu komplex</a:t>
+            </a:r>
+            <a:endParaRPr lang="en-US" dirty="0"/>
           </a:p>
         </p:txBody>
       </p:sp>
@@ -4017,7 +4031,39 @@
           <a:lstStyle/>
           <a:p>
             <a:pPr defTabSz="914400" eaLnBrk="1" hangingPunct="1"/>
-            <a:endParaRPr lang="en-US"/>
+            <a:r>
+              <a:rPr lang="de-DE" dirty="0" smtClean="0"/>
+              <a:t>Es gibt ja noch ein </a:t>
+            </a:r>
+            <a:r>
+              <a:rPr lang="de-DE" dirty="0" err="1" smtClean="0"/>
+              <a:t>Selection</a:t>
+            </a:r>
+            <a:r>
+              <a:rPr lang="de-DE" dirty="0" smtClean="0"/>
+              <a:t> Tool.</a:t>
+            </a:r>
+            <a:r>
+              <a:rPr lang="de-DE" baseline="0" dirty="0" smtClean="0"/>
+              <a:t>  Verantwortlichkeit 1 und 3 können in Oberklasse Tool ausgelagert werden. Tool bekommt eine neue Verantwortlichkeit, von </a:t>
+            </a:r>
+            <a:r>
+              <a:rPr lang="de-DE" baseline="0" dirty="0" err="1" smtClean="0"/>
+              <a:t>Creation</a:t>
+            </a:r>
+            <a:r>
+              <a:rPr lang="de-DE" baseline="0" dirty="0" smtClean="0"/>
+              <a:t> Tool/</a:t>
+            </a:r>
+            <a:r>
+              <a:rPr lang="de-DE" baseline="0" dirty="0" err="1" smtClean="0"/>
+              <a:t>Selection</a:t>
+            </a:r>
+            <a:r>
+              <a:rPr lang="de-DE" baseline="0" dirty="0" smtClean="0"/>
+              <a:t> Tool werden Verantwortlichkeiten entfernt</a:t>
+            </a:r>
+            <a:endParaRPr lang="en-US" dirty="0"/>
           </a:p>
         </p:txBody>
       </p:sp>
@@ -4111,7 +4157,26 @@
           <a:lstStyle/>
           <a:p>
             <a:pPr defTabSz="914400" eaLnBrk="1" hangingPunct="1"/>
-            <a:endParaRPr lang="en-US"/>
+            <a:r>
+              <a:rPr lang="de-DE" dirty="0" smtClean="0"/>
+              <a:t>Wenn Klassen fehlen, wieder einen Schritt zurück gehen</a:t>
+            </a:r>
+          </a:p>
+          <a:p>
+            <a:pPr defTabSz="914400" eaLnBrk="1" hangingPunct="1"/>
+            <a:endParaRPr lang="de-DE" dirty="0" smtClean="0"/>
+          </a:p>
+          <a:p>
+            <a:pPr defTabSz="914400" eaLnBrk="1" hangingPunct="1"/>
+            <a:r>
+              <a:rPr lang="de-DE" dirty="0" smtClean="0"/>
+              <a:t>Bei</a:t>
+            </a:r>
+            <a:r>
+              <a:rPr lang="de-DE" baseline="0" dirty="0" smtClean="0"/>
+              <a:t> freier Auswahl (und Unklarheiten): kommunizieren! mit Teammitgliedern, Software-Architekt</a:t>
+            </a:r>
+            <a:endParaRPr lang="en-US" dirty="0"/>
           </a:p>
         </p:txBody>
       </p:sp>
@@ -4205,7 +4270,15 @@
           <a:lstStyle/>
           <a:p>
             <a:pPr defTabSz="914400" eaLnBrk="1" hangingPunct="1"/>
-            <a:endParaRPr lang="en-US"/>
+            <a:r>
+              <a:rPr lang="de-DE" dirty="0" smtClean="0"/>
+              <a:t>(Mehr</a:t>
+            </a:r>
+            <a:r>
+              <a:rPr lang="de-DE" baseline="0" dirty="0" smtClean="0"/>
+              <a:t> dazu nächste Woche)</a:t>
+            </a:r>
+            <a:endParaRPr lang="en-US" dirty="0"/>
           </a:p>
         </p:txBody>
       </p:sp>
@@ -4455,7 +4528,7 @@
           <a:lstStyle/>
           <a:p>
             <a:pPr defTabSz="914400" eaLnBrk="1" hangingPunct="1"/>
-            <a:endParaRPr lang="en-US"/>
+            <a:endParaRPr lang="en-US" dirty="0"/>
           </a:p>
         </p:txBody>
       </p:sp>
@@ -5327,7 +5400,15 @@
           <a:lstStyle/>
           <a:p>
             <a:pPr defTabSz="914400" eaLnBrk="1" hangingPunct="1"/>
-            <a:endParaRPr lang="en-US"/>
+            <a:r>
+              <a:rPr lang="de-DE" dirty="0" smtClean="0"/>
+              <a:t>Wenn eine</a:t>
+            </a:r>
+            <a:r>
+              <a:rPr lang="de-DE" baseline="0" dirty="0" smtClean="0"/>
+              <a:t> Unterklasse eine Eigenschaft einer Oberklasse nicht haben soll, sollte sie nicht in der Hierarchie sein; Mehrfachvererbung geht nicht</a:t>
+            </a:r>
+            <a:endParaRPr lang="en-US" dirty="0"/>
           </a:p>
         </p:txBody>
       </p:sp>
@@ -5515,7 +5596,15 @@
           <a:lstStyle/>
           <a:p>
             <a:pPr defTabSz="914400" eaLnBrk="1" hangingPunct="1"/>
-            <a:endParaRPr lang="en-US"/>
+            <a:r>
+              <a:rPr lang="de-DE" dirty="0" smtClean="0"/>
+              <a:t>Vorsicht: Mehrfachvererbung</a:t>
+            </a:r>
+            <a:r>
+              <a:rPr lang="de-DE" baseline="0" dirty="0" smtClean="0"/>
+              <a:t> nicht immer möglich</a:t>
+            </a:r>
+            <a:endParaRPr lang="en-US" dirty="0"/>
           </a:p>
         </p:txBody>
       </p:sp>
@@ -18952,7 +19041,7 @@
                         <a:tabLst/>
                       </a:pPr>
                       <a:r>
-                        <a:rPr kumimoji="0" lang="en-US" sz="1800" b="0" i="0" u="none" strike="noStrike" cap="none" normalizeH="0" baseline="0">
+                        <a:rPr kumimoji="0" lang="en-US" sz="1800" b="0" i="0" u="none" strike="noStrike" cap="none" normalizeH="0" baseline="0" dirty="0">
                           <a:ln>
                             <a:noFill/>
                           </a:ln>
@@ -22051,7 +22140,7 @@
       </p:grpSpPr>
       <p:sp>
         <p:nvSpPr>
-          <p:cNvPr id="537605" name="Rectangle 2"/>
+          <p:cNvPr id="539653" name="Rectangle 2"/>
           <p:cNvSpPr>
             <a:spLocks noGrp="1" noChangeArrowheads="1"/>
           </p:cNvSpPr>
@@ -22068,14 +22157,31 @@
           <a:p>
             <a:r>
               <a:rPr lang="de-DE" dirty="0"/>
-              <a:t>Zuweisen von Verantwortlichkeiten</a:t>
-            </a:r>
+              <a:t>Zuweisen</a:t>
+            </a:r>
+            <a:r>
+              <a:rPr lang="en-US" dirty="0"/>
+              <a:t> von </a:t>
+            </a:r>
+            <a:r>
+              <a:rPr lang="de-DE" dirty="0" smtClean="0"/>
+              <a:t>Verantwortlichkeiten</a:t>
+            </a:r>
+            <a:r>
+              <a:rPr lang="en-US" dirty="0" smtClean="0"/>
+              <a:t>: </a:t>
+            </a:r>
+            <a:r>
+              <a:rPr lang="en-US" dirty="0" err="1" smtClean="0"/>
+              <a:t>Zentral</a:t>
+            </a:r>
+            <a:endParaRPr lang="en-US" dirty="0"/>
           </a:p>
         </p:txBody>
       </p:sp>
       <p:sp>
         <p:nvSpPr>
-          <p:cNvPr id="537606" name="Rectangle 3"/>
+          <p:cNvPr id="539654" name="Rectangle 3"/>
           <p:cNvSpPr>
             <a:spLocks noGrp="1" noChangeArrowheads="1"/>
           </p:cNvSpPr>
@@ -22090,188 +22196,92 @@
           </a:bodyPr>
           <a:lstStyle/>
           <a:p>
-            <a:pPr marL="419100" indent="-419100">
-              <a:lnSpc>
-                <a:spcPct val="80000"/>
-              </a:lnSpc>
+            <a:pPr marL="533400" indent="-533400"/>
+            <a:r>
+              <a:rPr lang="de-DE" dirty="0"/>
+              <a:t>Behalte Informationen über eine Sache an </a:t>
+            </a:r>
+            <a:r>
+              <a:rPr lang="de-DE" i="1" dirty="0">
+                <a:solidFill>
+                  <a:srgbClr val="7F0101"/>
+                </a:solidFill>
+              </a:rPr>
+              <a:t>einem </a:t>
+            </a:r>
+            <a:r>
+              <a:rPr lang="de-DE" i="1" dirty="0" smtClean="0">
+                <a:solidFill>
+                  <a:srgbClr val="7F0101"/>
+                </a:solidFill>
+              </a:rPr>
+              <a:t>Ort</a:t>
+            </a:r>
+          </a:p>
+          <a:p>
+            <a:pPr marL="533400" indent="-533400"/>
+            <a:r>
+              <a:rPr lang="de-DE" dirty="0" smtClean="0"/>
+              <a:t>Ein Objekt wird zum Kontrollzentrum</a:t>
+            </a:r>
+            <a:endParaRPr lang="de-DE" dirty="0"/>
+          </a:p>
+          <a:p>
+            <a:pPr marL="914400" lvl="1" indent="-457200"/>
+            <a:r>
+              <a:rPr lang="de-DE" dirty="0"/>
+              <a:t>Falls mehrere Objekte </a:t>
+            </a:r>
+            <a:r>
+              <a:rPr lang="de-DE" dirty="0" smtClean="0"/>
+              <a:t>Zugriff </a:t>
+            </a:r>
+            <a:r>
+              <a:rPr lang="de-DE" dirty="0"/>
+              <a:t>auf die gleiche Information benötigen:</a:t>
+            </a:r>
+          </a:p>
+          <a:p>
+            <a:pPr marL="1295400" lvl="2" indent="-381000">
+              <a:buFont typeface="Times" pitchFamily="18" charset="0"/>
+              <a:buAutoNum type="arabicPeriod"/>
             </a:pPr>
             <a:r>
-              <a:rPr lang="de-DE" i="1" dirty="0">
-                <a:solidFill>
-                  <a:srgbClr val="7F0101"/>
-                </a:solidFill>
-              </a:rPr>
-              <a:t>Verteile gleichmäßig</a:t>
-            </a:r>
-            <a:r>
               <a:rPr lang="de-DE" dirty="0"/>
-              <a:t> die System-Intelligenz</a:t>
-            </a:r>
-          </a:p>
-          <a:p>
-            <a:pPr marL="838200" lvl="1" indent="-381000">
-              <a:lnSpc>
-                <a:spcPct val="80000"/>
-              </a:lnSpc>
+              <a:t>Ein neues Objekte kann eingeführt werden, welches die Information verwaltet, oder</a:t>
+            </a:r>
+          </a:p>
+          <a:p>
+            <a:pPr marL="1295400" lvl="2" indent="-381000">
+              <a:buFont typeface="Times" pitchFamily="18" charset="0"/>
+              <a:buAutoNum type="arabicPeriod"/>
             </a:pPr>
             <a:r>
               <a:rPr lang="de-DE" dirty="0"/>
-              <a:t>Verhindere prozedural zentralisierte Verantwortlichkeiten</a:t>
-            </a:r>
-          </a:p>
-          <a:p>
-            <a:pPr marL="838200" lvl="1" indent="-381000">
-              <a:lnSpc>
-                <a:spcPct val="80000"/>
-              </a:lnSpc>
+              <a:t>Eines der vorhandenen Objekte kann die Information verwalten, oder</a:t>
+            </a:r>
+          </a:p>
+          <a:p>
+            <a:pPr marL="1295400" lvl="2" indent="-381000">
+              <a:buFont typeface="Times" pitchFamily="18" charset="0"/>
+              <a:buAutoNum type="arabicPeriod"/>
             </a:pPr>
             <a:r>
               <a:rPr lang="de-DE" dirty="0"/>
-              <a:t>Halte Verantwortlichkeiten nah an den Objekten und nicht an deren Nutzern</a:t>
-            </a:r>
-          </a:p>
-          <a:p>
-            <a:pPr marL="419100" indent="-419100">
-              <a:lnSpc>
-                <a:spcPct val="80000"/>
-              </a:lnSpc>
-            </a:pPr>
+              <a:t>die mehrfachen Objekte können in ein einzelnes Objekt überführt </a:t>
+            </a:r>
+            <a:r>
+              <a:rPr lang="de-DE" dirty="0" smtClean="0"/>
+              <a:t>werden</a:t>
+            </a:r>
+          </a:p>
+          <a:p>
+            <a:pPr marL="457200"/>
+            <a:r>
+              <a:rPr lang="de-DE" dirty="0" smtClean="0"/>
+              <a:t>Sinnvoll bei kleinen Systemen</a:t>
+            </a:r>
             <a:endParaRPr lang="de-DE" dirty="0"/>
-          </a:p>
-          <a:p>
-            <a:pPr marL="419100" indent="-419100">
-              <a:lnSpc>
-                <a:spcPct val="80000"/>
-              </a:lnSpc>
-            </a:pPr>
-            <a:r>
-              <a:rPr lang="de-DE" dirty="0"/>
-              <a:t>Definiere Verantwortlichkeiten so </a:t>
-            </a:r>
-            <a:r>
-              <a:rPr lang="de-DE" i="1" dirty="0">
-                <a:solidFill>
-                  <a:srgbClr val="7F0101"/>
-                </a:solidFill>
-              </a:rPr>
-              <a:t>generell </a:t>
-            </a:r>
-            <a:r>
-              <a:rPr lang="de-DE" dirty="0"/>
-              <a:t>wie möglich</a:t>
-            </a:r>
-          </a:p>
-          <a:p>
-            <a:pPr marL="838200" lvl="1" indent="-381000">
-              <a:lnSpc>
-                <a:spcPct val="80000"/>
-              </a:lnSpc>
-            </a:pPr>
-            <a:r>
-              <a:rPr lang="de-DE" dirty="0"/>
-              <a:t>“</a:t>
-            </a:r>
-            <a:r>
-              <a:rPr lang="de-DE" dirty="0" err="1"/>
-              <a:t>draw</a:t>
-            </a:r>
-            <a:r>
-              <a:rPr lang="de-DE" dirty="0"/>
-              <a:t> </a:t>
-            </a:r>
-            <a:r>
-              <a:rPr lang="de-DE" dirty="0" err="1"/>
-              <a:t>yourself</a:t>
-            </a:r>
-            <a:r>
-              <a:rPr lang="de-DE" dirty="0"/>
-              <a:t>” vs. “</a:t>
-            </a:r>
-            <a:r>
-              <a:rPr lang="de-DE" dirty="0" err="1"/>
-              <a:t>draw</a:t>
-            </a:r>
-            <a:r>
-              <a:rPr lang="de-DE" dirty="0"/>
-              <a:t> a </a:t>
-            </a:r>
-            <a:r>
-              <a:rPr lang="de-DE" dirty="0" err="1"/>
-              <a:t>line</a:t>
-            </a:r>
-            <a:r>
-              <a:rPr lang="de-DE" dirty="0"/>
-              <a:t>/</a:t>
-            </a:r>
-            <a:r>
-              <a:rPr lang="de-DE" dirty="0" err="1"/>
-              <a:t>rectangle</a:t>
-            </a:r>
-            <a:r>
-              <a:rPr lang="de-DE" dirty="0"/>
-              <a:t> etc.”</a:t>
-            </a:r>
-          </a:p>
-          <a:p>
-            <a:pPr marL="838200" lvl="1" indent="-381000">
-              <a:lnSpc>
-                <a:spcPct val="80000"/>
-              </a:lnSpc>
-            </a:pPr>
-            <a:r>
-              <a:rPr lang="de-DE" dirty="0"/>
-              <a:t>Führt zum Teilen</a:t>
-            </a:r>
-          </a:p>
-          <a:p>
-            <a:pPr marL="419100" indent="-419100">
-              <a:lnSpc>
-                <a:spcPct val="80000"/>
-              </a:lnSpc>
-            </a:pPr>
-            <a:endParaRPr lang="de-DE" dirty="0"/>
-          </a:p>
-          <a:p>
-            <a:pPr marL="419100" indent="-419100">
-              <a:lnSpc>
-                <a:spcPct val="80000"/>
-              </a:lnSpc>
-            </a:pPr>
-            <a:r>
-              <a:rPr lang="de-DE" dirty="0"/>
-              <a:t>Halte </a:t>
-            </a:r>
-            <a:r>
-              <a:rPr lang="de-DE" i="1" dirty="0">
-                <a:solidFill>
-                  <a:srgbClr val="7F0101"/>
-                </a:solidFill>
-              </a:rPr>
-              <a:t>Verhalten</a:t>
-            </a:r>
-            <a:r>
-              <a:rPr lang="de-DE" dirty="0"/>
-              <a:t> zusammen mit jedweder </a:t>
-            </a:r>
-            <a:r>
-              <a:rPr lang="de-DE" i="1" dirty="0">
-                <a:solidFill>
-                  <a:srgbClr val="7F0101"/>
-                </a:solidFill>
-              </a:rPr>
-              <a:t>relevanten Information</a:t>
-            </a:r>
-          </a:p>
-          <a:p>
-            <a:pPr marL="838200" lvl="1" indent="-381000">
-              <a:lnSpc>
-                <a:spcPct val="80000"/>
-              </a:lnSpc>
-            </a:pPr>
-            <a:r>
-              <a:rPr lang="de-DE" dirty="0"/>
-              <a:t>Prinzip der Kapselung</a:t>
-            </a:r>
           </a:p>
         </p:txBody>
       </p:sp>
@@ -22355,9 +22365,9 @@
                                           </p:stCondLst>
                                         </p:cTn>
                                         <p:tgtEl>
-                                          <p:spTgt spid="537606">
+                                          <p:spTgt spid="539654">
                                             <p:txEl>
-                                              <p:pRg st="4" end="4"/>
+                                              <p:pRg st="2" end="2"/>
                                             </p:txEl>
                                           </p:spTgt>
                                         </p:tgtEl>
@@ -22373,9 +22383,9 @@
                                       <p:cBhvr>
                                         <p:cTn id="7" dur="1000"/>
                                         <p:tgtEl>
-                                          <p:spTgt spid="537606">
+                                          <p:spTgt spid="539654">
                                             <p:txEl>
-                                              <p:pRg st="4" end="4"/>
+                                              <p:pRg st="2" end="2"/>
                                             </p:txEl>
                                           </p:spTgt>
                                         </p:tgtEl>
@@ -22398,9 +22408,9 @@
                                           </p:stCondLst>
                                         </p:cTn>
                                         <p:tgtEl>
-                                          <p:spTgt spid="537606">
+                                          <p:spTgt spid="539654">
                                             <p:txEl>
-                                              <p:pRg st="5" end="5"/>
+                                              <p:pRg st="3" end="3"/>
                                             </p:txEl>
                                           </p:spTgt>
                                         </p:tgtEl>
@@ -22416,9 +22426,9 @@
                                       <p:cBhvr>
                                         <p:cTn id="10" dur="1000"/>
                                         <p:tgtEl>
-                                          <p:spTgt spid="537606">
+                                          <p:spTgt spid="539654">
                                             <p:txEl>
-                                              <p:pRg st="5" end="5"/>
+                                              <p:pRg st="3" end="3"/>
                                             </p:txEl>
                                           </p:spTgt>
                                         </p:tgtEl>
@@ -22441,7 +22451,93 @@
                                           </p:stCondLst>
                                         </p:cTn>
                                         <p:tgtEl>
-                                          <p:spTgt spid="537606">
+                                          <p:spTgt spid="539654">
+                                            <p:txEl>
+                                              <p:pRg st="4" end="4"/>
+                                            </p:txEl>
+                                          </p:spTgt>
+                                        </p:tgtEl>
+                                        <p:attrNameLst>
+                                          <p:attrName>style.visibility</p:attrName>
+                                        </p:attrNameLst>
+                                      </p:cBhvr>
+                                      <p:to>
+                                        <p:strVal val="visible"/>
+                                      </p:to>
+                                    </p:set>
+                                    <p:animEffect transition="in" filter="fade">
+                                      <p:cBhvr>
+                                        <p:cTn id="13" dur="1000"/>
+                                        <p:tgtEl>
+                                          <p:spTgt spid="539654">
+                                            <p:txEl>
+                                              <p:pRg st="4" end="4"/>
+                                            </p:txEl>
+                                          </p:spTgt>
+                                        </p:tgtEl>
+                                      </p:cBhvr>
+                                    </p:animEffect>
+                                  </p:childTnLst>
+                                </p:cTn>
+                              </p:par>
+                              <p:par>
+                                <p:cTn id="14" presetID="10" presetClass="entr" presetSubtype="0" fill="hold" nodeType="withEffect">
+                                  <p:stCondLst>
+                                    <p:cond delay="0"/>
+                                  </p:stCondLst>
+                                  <p:childTnLst>
+                                    <p:set>
+                                      <p:cBhvr>
+                                        <p:cTn id="15" dur="1" fill="hold">
+                                          <p:stCondLst>
+                                            <p:cond delay="0"/>
+                                          </p:stCondLst>
+                                        </p:cTn>
+                                        <p:tgtEl>
+                                          <p:spTgt spid="539654">
+                                            <p:txEl>
+                                              <p:pRg st="5" end="5"/>
+                                            </p:txEl>
+                                          </p:spTgt>
+                                        </p:tgtEl>
+                                        <p:attrNameLst>
+                                          <p:attrName>style.visibility</p:attrName>
+                                        </p:attrNameLst>
+                                      </p:cBhvr>
+                                      <p:to>
+                                        <p:strVal val="visible"/>
+                                      </p:to>
+                                    </p:set>
+                                    <p:animEffect transition="in" filter="fade">
+                                      <p:cBhvr>
+                                        <p:cTn id="16" dur="1000"/>
+                                        <p:tgtEl>
+                                          <p:spTgt spid="539654">
+                                            <p:txEl>
+                                              <p:pRg st="5" end="5"/>
+                                            </p:txEl>
+                                          </p:spTgt>
+                                        </p:tgtEl>
+                                      </p:cBhvr>
+                                    </p:animEffect>
+                                  </p:childTnLst>
+                                </p:cTn>
+                              </p:par>
+                              <p:par>
+                                <p:cTn id="17" presetID="10" presetClass="entr" presetSubtype="0" fill="hold" nodeType="withEffect">
+                                  <p:stCondLst>
+                                    <p:cond delay="0"/>
+                                  </p:stCondLst>
+                                  <p:childTnLst>
+                                    <p:set>
+                                      <p:cBhvr>
+                                        <p:cTn id="18" dur="1" fill="hold">
+                                          <p:stCondLst>
+                                            <p:cond delay="0"/>
+                                          </p:stCondLst>
+                                        </p:cTn>
+                                        <p:tgtEl>
+                                          <p:spTgt spid="539654">
                                             <p:txEl>
                                               <p:pRg st="6" end="6"/>
                                             </p:txEl>
@@ -22457,115 +22553,11 @@
                                     </p:set>
                                     <p:animEffect transition="in" filter="fade">
                                       <p:cBhvr>
-                                        <p:cTn id="13" dur="1000"/>
+                                        <p:cTn id="19" dur="1000"/>
                                         <p:tgtEl>
-                                          <p:spTgt spid="537606">
+                                          <p:spTgt spid="539654">
                                             <p:txEl>
                                               <p:pRg st="6" end="6"/>
-                                            </p:txEl>
-                                          </p:spTgt>
-                                        </p:tgtEl>
-                                      </p:cBhvr>
-                                    </p:animEffect>
-                                  </p:childTnLst>
-                                </p:cTn>
-                              </p:par>
-                            </p:childTnLst>
-                          </p:cTn>
-                        </p:par>
-                      </p:childTnLst>
-                    </p:cTn>
-                  </p:par>
-                  <p:par>
-                    <p:cTn id="14" fill="hold">
-                      <p:stCondLst>
-                        <p:cond delay="indefinite"/>
-                      </p:stCondLst>
-                      <p:childTnLst>
-                        <p:par>
-                          <p:cTn id="15" fill="hold">
-                            <p:stCondLst>
-                              <p:cond delay="0"/>
-                            </p:stCondLst>
-                            <p:childTnLst>
-                              <p:par>
-                                <p:cTn id="16" presetID="10" presetClass="entr" presetSubtype="0" fill="hold" nodeType="clickEffect">
-                                  <p:stCondLst>
-                                    <p:cond delay="0"/>
-                                  </p:stCondLst>
-                                  <p:childTnLst>
-                                    <p:set>
-                                      <p:cBhvr>
-                                        <p:cTn id="17" dur="1" fill="hold">
-                                          <p:stCondLst>
-                                            <p:cond delay="0"/>
-                                          </p:stCondLst>
-                                        </p:cTn>
-                                        <p:tgtEl>
-                                          <p:spTgt spid="537606">
-                                            <p:txEl>
-                                              <p:pRg st="8" end="8"/>
-                                            </p:txEl>
-                                          </p:spTgt>
-                                        </p:tgtEl>
-                                        <p:attrNameLst>
-                                          <p:attrName>style.visibility</p:attrName>
-                                        </p:attrNameLst>
-                                      </p:cBhvr>
-                                      <p:to>
-                                        <p:strVal val="visible"/>
-                                      </p:to>
-                                    </p:set>
-                                    <p:animEffect transition="in" filter="fade">
-                                      <p:cBhvr>
-                                        <p:cTn id="18" dur="1000"/>
-                                        <p:tgtEl>
-                                          <p:spTgt spid="537606">
-                                            <p:txEl>
-                                              <p:pRg st="8" end="8"/>
-                                            </p:txEl>
-                                          </p:spTgt>
-                                        </p:tgtEl>
-                                      </p:cBhvr>
-                                    </p:animEffect>
-                                  </p:childTnLst>
-                                </p:cTn>
-                              </p:par>
-                              <p:par>
-                                <p:cTn id="19" presetID="10" presetClass="entr" presetSubtype="0" fill="hold" nodeType="withEffect">
-                                  <p:stCondLst>
-                                    <p:cond delay="0"/>
-                                  </p:stCondLst>
-                                  <p:childTnLst>
-                                    <p:set>
-                                      <p:cBhvr>
-                                        <p:cTn id="20" dur="1" fill="hold">
-                                          <p:stCondLst>
-                                            <p:cond delay="0"/>
-                                          </p:stCondLst>
-                                        </p:cTn>
-                                        <p:tgtEl>
-                                          <p:spTgt spid="537606">
-                                            <p:txEl>
-                                              <p:pRg st="9" end="9"/>
-                                            </p:txEl>
-                                          </p:spTgt>
-                                        </p:tgtEl>
-                                        <p:attrNameLst>
-                                          <p:attrName>style.visibility</p:attrName>
-                                        </p:attrNameLst>
-                                      </p:cBhvr>
-                                      <p:to>
-                                        <p:strVal val="visible"/>
-                                      </p:to>
-                                    </p:set>
-                                    <p:animEffect transition="in" filter="fade">
-                                      <p:cBhvr>
-                                        <p:cTn id="21" dur="1000"/>
-                                        <p:tgtEl>
-                                          <p:spTgt spid="537606">
-                                            <p:txEl>
-                                              <p:pRg st="9" end="9"/>
                                             </p:txEl>
                                           </p:spTgt>
                                         </p:tgtEl>
@@ -22624,7 +22616,7 @@
       </p:grpSpPr>
       <p:sp>
         <p:nvSpPr>
-          <p:cNvPr id="539653" name="Rectangle 2"/>
+          <p:cNvPr id="537605" name="Rectangle 2"/>
           <p:cNvSpPr>
             <a:spLocks noGrp="1" noChangeArrowheads="1"/>
           </p:cNvSpPr>
@@ -22641,26 +22633,19 @@
           <a:p>
             <a:r>
               <a:rPr lang="de-DE" dirty="0"/>
-              <a:t>Zuweisen</a:t>
-            </a:r>
-            <a:r>
-              <a:rPr lang="en-US" dirty="0"/>
-              <a:t> von </a:t>
-            </a:r>
-            <a:r>
-              <a:rPr lang="de-DE" dirty="0"/>
-              <a:t>Verantwortlichkeiten</a:t>
-            </a:r>
-            <a:r>
-              <a:rPr lang="en-US" dirty="0"/>
-              <a:t>...</a:t>
-            </a:r>
+              <a:t>Zuweisen von </a:t>
+            </a:r>
+            <a:r>
+              <a:rPr lang="de-DE" dirty="0" smtClean="0"/>
+              <a:t>Verantwortlichkeiten: Delegiert/Gebündelt</a:t>
+            </a:r>
+            <a:endParaRPr lang="de-DE" dirty="0"/>
           </a:p>
         </p:txBody>
       </p:sp>
       <p:sp>
         <p:nvSpPr>
-          <p:cNvPr id="539654" name="Rectangle 3"/>
+          <p:cNvPr id="537606" name="Rectangle 3"/>
           <p:cNvSpPr>
             <a:spLocks noGrp="1" noChangeArrowheads="1"/>
           </p:cNvSpPr>
@@ -22671,71 +22656,26 @@
         <p:spPr/>
         <p:txBody>
           <a:bodyPr vert="horz" lIns="0" tIns="0" rIns="0" bIns="0" rtlCol="0">
-            <a:normAutofit/>
+            <a:normAutofit lnSpcReduction="10000"/>
           </a:bodyPr>
           <a:lstStyle/>
           <a:p>
-            <a:pPr marL="533400" indent="-533400"/>
+            <a:pPr marL="514350" indent="-457200"/>
+            <a:r>
+              <a:rPr lang="de-DE" dirty="0" smtClean="0"/>
+              <a:t>Breche </a:t>
+            </a:r>
             <a:r>
               <a:rPr lang="de-DE" dirty="0"/>
-              <a:t>Behalte Informationen über eine Sache an </a:t>
-            </a:r>
-            <a:r>
-              <a:rPr lang="de-DE" i="1" dirty="0">
-                <a:solidFill>
-                  <a:srgbClr val="7F0101"/>
-                </a:solidFill>
-              </a:rPr>
-              <a:t>einem Ort</a:t>
-            </a:r>
-            <a:endParaRPr lang="de-DE" dirty="0"/>
+              <a:t>komplexe Verantwortlichkeiten </a:t>
+            </a:r>
+            <a:r>
+              <a:rPr lang="de-DE" dirty="0" smtClean="0"/>
+              <a:t>auf</a:t>
+            </a:r>
           </a:p>
           <a:p>
             <a:pPr marL="914400" lvl="1" indent="-457200"/>
-            <a:r>
-              <a:rPr lang="de-DE" dirty="0"/>
-              <a:t>Falls mehrere Objekte Zugriffe auf die gleiche Information benötigen:</a:t>
-            </a:r>
-          </a:p>
-          <a:p>
-            <a:pPr marL="1295400" lvl="2" indent="-381000">
-              <a:buFont typeface="Times" pitchFamily="18" charset="0"/>
-              <a:buAutoNum type="arabicPeriod"/>
-            </a:pPr>
-            <a:r>
-              <a:rPr lang="de-DE" dirty="0"/>
-              <a:t>Ein neues Objekte kann eingeführt werden, welches die Information verwaltet, oder</a:t>
-            </a:r>
-          </a:p>
-          <a:p>
-            <a:pPr marL="1295400" lvl="2" indent="-381000">
-              <a:buFont typeface="Times" pitchFamily="18" charset="0"/>
-              <a:buAutoNum type="arabicPeriod"/>
-            </a:pPr>
-            <a:r>
-              <a:rPr lang="de-DE" dirty="0"/>
-              <a:t>Eines der vorhandenen Objekte kann die Information verwalten, oder</a:t>
-            </a:r>
-          </a:p>
-          <a:p>
-            <a:pPr marL="1295400" lvl="2" indent="-381000">
-              <a:buFont typeface="Times" pitchFamily="18" charset="0"/>
-              <a:buAutoNum type="arabicPeriod"/>
-            </a:pPr>
-            <a:r>
-              <a:rPr lang="de-DE" dirty="0"/>
-              <a:t>die mehrfachen Objekte können in ein einzelnes Objekt überführt werden</a:t>
-            </a:r>
-          </a:p>
-          <a:p>
-            <a:pPr marL="1295400" lvl="2" indent="-381000">
-              <a:buFont typeface="Times" pitchFamily="18" charset="0"/>
-              <a:buAutoNum type="arabicPeriod"/>
-            </a:pPr>
-            <a:endParaRPr lang="en-US" dirty="0"/>
-          </a:p>
-          <a:p>
-            <a:pPr marL="533400" indent="-533400"/>
             <a:r>
               <a:rPr lang="de-DE" i="1" dirty="0">
                 <a:solidFill>
@@ -22750,12 +22690,209 @@
             </a:r>
           </a:p>
           <a:p>
-            <a:pPr marL="914400" lvl="1" indent="-457200"/>
+            <a:pPr marL="0" indent="0">
+              <a:lnSpc>
+                <a:spcPct val="80000"/>
+              </a:lnSpc>
+              <a:buNone/>
+            </a:pPr>
+            <a:endParaRPr lang="de-DE" i="1" dirty="0" smtClean="0">
+              <a:solidFill>
+                <a:srgbClr val="7F0101"/>
+              </a:solidFill>
+            </a:endParaRPr>
+          </a:p>
+          <a:p>
+            <a:pPr marL="419100" indent="-419100">
+              <a:lnSpc>
+                <a:spcPct val="80000"/>
+              </a:lnSpc>
+            </a:pPr>
+            <a:r>
+              <a:rPr lang="de-DE" i="1" dirty="0" smtClean="0">
+                <a:solidFill>
+                  <a:srgbClr val="7F0101"/>
+                </a:solidFill>
+              </a:rPr>
+              <a:t>Verteile </a:t>
+            </a:r>
+            <a:r>
+              <a:rPr lang="de-DE" i="1" dirty="0">
+                <a:solidFill>
+                  <a:srgbClr val="7F0101"/>
+                </a:solidFill>
+              </a:rPr>
+              <a:t>gleichmäßig</a:t>
+            </a:r>
             <a:r>
               <a:rPr lang="de-DE" dirty="0"/>
-              <a:t>Breche komplexe Verantwortlichkeiten auf</a:t>
-            </a:r>
-            <a:endParaRPr lang="en-US" dirty="0"/>
+              <a:t> die System-Intelligenz</a:t>
+            </a:r>
+          </a:p>
+          <a:p>
+            <a:pPr marL="838200" lvl="1" indent="-381000">
+              <a:lnSpc>
+                <a:spcPct val="80000"/>
+              </a:lnSpc>
+            </a:pPr>
+            <a:r>
+              <a:rPr lang="de-DE" dirty="0"/>
+              <a:t>Verhindere prozedural zentralisierte Verantwortlichkeiten</a:t>
+            </a:r>
+          </a:p>
+          <a:p>
+            <a:pPr marL="838200" lvl="1" indent="-381000">
+              <a:lnSpc>
+                <a:spcPct val="80000"/>
+              </a:lnSpc>
+            </a:pPr>
+            <a:r>
+              <a:rPr lang="de-DE" dirty="0"/>
+              <a:t>Halte Verantwortlichkeiten nah an den Objekten und nicht an deren Nutzern</a:t>
+            </a:r>
+          </a:p>
+          <a:p>
+            <a:pPr marL="419100" indent="-419100">
+              <a:lnSpc>
+                <a:spcPct val="80000"/>
+              </a:lnSpc>
+            </a:pPr>
+            <a:endParaRPr lang="de-DE" dirty="0"/>
+          </a:p>
+          <a:p>
+            <a:pPr marL="419100" indent="-419100">
+              <a:lnSpc>
+                <a:spcPct val="80000"/>
+              </a:lnSpc>
+            </a:pPr>
+            <a:r>
+              <a:rPr lang="de-DE" dirty="0"/>
+              <a:t>Definiere Verantwortlichkeiten so </a:t>
+            </a:r>
+            <a:r>
+              <a:rPr lang="de-DE" i="1" dirty="0">
+                <a:solidFill>
+                  <a:srgbClr val="7F0101"/>
+                </a:solidFill>
+              </a:rPr>
+              <a:t>generell </a:t>
+            </a:r>
+            <a:r>
+              <a:rPr lang="de-DE" dirty="0"/>
+              <a:t>wie möglich</a:t>
+            </a:r>
+          </a:p>
+          <a:p>
+            <a:pPr marL="838200" lvl="1" indent="-381000">
+              <a:lnSpc>
+                <a:spcPct val="80000"/>
+              </a:lnSpc>
+            </a:pPr>
+            <a:r>
+              <a:rPr lang="de-DE" dirty="0"/>
+              <a:t>“</a:t>
+            </a:r>
+            <a:r>
+              <a:rPr lang="de-DE" dirty="0" err="1"/>
+              <a:t>draw</a:t>
+            </a:r>
+            <a:r>
+              <a:rPr lang="de-DE" dirty="0"/>
+              <a:t> </a:t>
+            </a:r>
+            <a:r>
+              <a:rPr lang="de-DE" dirty="0" err="1"/>
+              <a:t>yourself</a:t>
+            </a:r>
+            <a:r>
+              <a:rPr lang="de-DE" dirty="0"/>
+              <a:t>” vs. “</a:t>
+            </a:r>
+            <a:r>
+              <a:rPr lang="de-DE" dirty="0" err="1"/>
+              <a:t>draw</a:t>
+            </a:r>
+            <a:r>
+              <a:rPr lang="de-DE" dirty="0"/>
+              <a:t> a </a:t>
+            </a:r>
+            <a:r>
+              <a:rPr lang="de-DE" dirty="0" err="1"/>
+              <a:t>line</a:t>
+            </a:r>
+            <a:r>
+              <a:rPr lang="de-DE" dirty="0"/>
+              <a:t>/</a:t>
+            </a:r>
+            <a:r>
+              <a:rPr lang="de-DE" dirty="0" err="1"/>
+              <a:t>rectangle</a:t>
+            </a:r>
+            <a:r>
+              <a:rPr lang="de-DE" dirty="0"/>
+              <a:t> etc.”</a:t>
+            </a:r>
+          </a:p>
+          <a:p>
+            <a:pPr marL="838200" lvl="1" indent="-381000">
+              <a:lnSpc>
+                <a:spcPct val="80000"/>
+              </a:lnSpc>
+            </a:pPr>
+            <a:r>
+              <a:rPr lang="de-DE" dirty="0"/>
+              <a:t>Führt zum Teilen</a:t>
+            </a:r>
+          </a:p>
+          <a:p>
+            <a:pPr marL="419100" indent="-419100">
+              <a:lnSpc>
+                <a:spcPct val="80000"/>
+              </a:lnSpc>
+            </a:pPr>
+            <a:endParaRPr lang="de-DE" dirty="0"/>
+          </a:p>
+          <a:p>
+            <a:pPr marL="419100" indent="-419100">
+              <a:lnSpc>
+                <a:spcPct val="80000"/>
+              </a:lnSpc>
+            </a:pPr>
+            <a:r>
+              <a:rPr lang="de-DE" dirty="0"/>
+              <a:t>Halte </a:t>
+            </a:r>
+            <a:r>
+              <a:rPr lang="de-DE" i="1" dirty="0">
+                <a:solidFill>
+                  <a:srgbClr val="7F0101"/>
+                </a:solidFill>
+              </a:rPr>
+              <a:t>Verhalten</a:t>
+            </a:r>
+            <a:r>
+              <a:rPr lang="de-DE" dirty="0"/>
+              <a:t> zusammen mit jedweder </a:t>
+            </a:r>
+            <a:r>
+              <a:rPr lang="de-DE" i="1" dirty="0">
+                <a:solidFill>
+                  <a:srgbClr val="7F0101"/>
+                </a:solidFill>
+              </a:rPr>
+              <a:t>relevanten Information</a:t>
+            </a:r>
+          </a:p>
+          <a:p>
+            <a:pPr marL="838200" lvl="1" indent="-381000">
+              <a:lnSpc>
+                <a:spcPct val="80000"/>
+              </a:lnSpc>
+            </a:pPr>
+            <a:r>
+              <a:rPr lang="de-DE" dirty="0"/>
+              <a:t>Prinzip der Kapselung</a:t>
+            </a:r>
           </a:p>
         </p:txBody>
       </p:sp>
@@ -22839,9 +22976,9 @@
                                           </p:stCondLst>
                                         </p:cTn>
                                         <p:tgtEl>
-                                          <p:spTgt spid="539654">
+                                          <p:spTgt spid="537606">
                                             <p:txEl>
-                                              <p:pRg st="1" end="1"/>
+                                              <p:pRg st="7" end="7"/>
                                             </p:txEl>
                                           </p:spTgt>
                                         </p:tgtEl>
@@ -22857,9 +22994,9 @@
                                       <p:cBhvr>
                                         <p:cTn id="7" dur="1000"/>
                                         <p:tgtEl>
-                                          <p:spTgt spid="539654">
+                                          <p:spTgt spid="537606">
                                             <p:txEl>
-                                              <p:pRg st="1" end="1"/>
+                                              <p:pRg st="7" end="7"/>
                                             </p:txEl>
                                           </p:spTgt>
                                         </p:tgtEl>
@@ -22882,9 +23019,9 @@
                                           </p:stCondLst>
                                         </p:cTn>
                                         <p:tgtEl>
-                                          <p:spTgt spid="539654">
+                                          <p:spTgt spid="537606">
                                             <p:txEl>
-                                              <p:pRg st="2" end="2"/>
+                                              <p:pRg st="8" end="8"/>
                                             </p:txEl>
                                           </p:spTgt>
                                         </p:tgtEl>
@@ -22900,9 +23037,9 @@
                                       <p:cBhvr>
                                         <p:cTn id="10" dur="1000"/>
                                         <p:tgtEl>
-                                          <p:spTgt spid="539654">
+                                          <p:spTgt spid="537606">
                                             <p:txEl>
-                                              <p:pRg st="2" end="2"/>
+                                              <p:pRg st="8" end="8"/>
                                             </p:txEl>
                                           </p:spTgt>
                                         </p:tgtEl>
@@ -22925,9 +23062,9 @@
                                           </p:stCondLst>
                                         </p:cTn>
                                         <p:tgtEl>
-                                          <p:spTgt spid="539654">
+                                          <p:spTgt spid="537606">
                                             <p:txEl>
-                                              <p:pRg st="3" end="3"/>
+                                              <p:pRg st="9" end="9"/>
                                             </p:txEl>
                                           </p:spTgt>
                                         </p:tgtEl>
@@ -22943,52 +23080,9 @@
                                       <p:cBhvr>
                                         <p:cTn id="13" dur="1000"/>
                                         <p:tgtEl>
-                                          <p:spTgt spid="539654">
+                                          <p:spTgt spid="537606">
                                             <p:txEl>
-                                              <p:pRg st="3" end="3"/>
-                                            </p:txEl>
-                                          </p:spTgt>
-                                        </p:tgtEl>
-                                      </p:cBhvr>
-                                    </p:animEffect>
-                                  </p:childTnLst>
-                                </p:cTn>
-                              </p:par>
-                              <p:par>
-                                <p:cTn id="14" presetID="10" presetClass="entr" presetSubtype="0" fill="hold" nodeType="withEffect">
-                                  <p:stCondLst>
-                                    <p:cond delay="0"/>
-                                  </p:stCondLst>
-                                  <p:childTnLst>
-                                    <p:set>
-                                      <p:cBhvr>
-                                        <p:cTn id="15" dur="1" fill="hold">
-                                          <p:stCondLst>
-                                            <p:cond delay="0"/>
-                                          </p:stCondLst>
-                                        </p:cTn>
-                                        <p:tgtEl>
-                                          <p:spTgt spid="539654">
-                                            <p:txEl>
-                                              <p:pRg st="4" end="4"/>
-                                            </p:txEl>
-                                          </p:spTgt>
-                                        </p:tgtEl>
-                                        <p:attrNameLst>
-                                          <p:attrName>style.visibility</p:attrName>
-                                        </p:attrNameLst>
-                                      </p:cBhvr>
-                                      <p:to>
-                                        <p:strVal val="visible"/>
-                                      </p:to>
-                                    </p:set>
-                                    <p:animEffect transition="in" filter="fade">
-                                      <p:cBhvr>
-                                        <p:cTn id="16" dur="1000"/>
-                                        <p:tgtEl>
-                                          <p:spTgt spid="539654">
-                                            <p:txEl>
-                                              <p:pRg st="4" end="4"/>
+                                              <p:pRg st="9" end="9"/>
                                             </p:txEl>
                                           </p:spTgt>
                                         </p:tgtEl>
@@ -23004,19 +23098,62 @@
                     </p:cTn>
                   </p:par>
                   <p:par>
-                    <p:cTn id="17" fill="hold">
+                    <p:cTn id="14" fill="hold">
                       <p:stCondLst>
                         <p:cond delay="indefinite"/>
                       </p:stCondLst>
                       <p:childTnLst>
                         <p:par>
-                          <p:cTn id="18" fill="hold">
+                          <p:cTn id="15" fill="hold">
                             <p:stCondLst>
                               <p:cond delay="0"/>
                             </p:stCondLst>
                             <p:childTnLst>
                               <p:par>
-                                <p:cTn id="19" presetID="10" presetClass="entr" presetSubtype="0" fill="hold" nodeType="clickEffect">
+                                <p:cTn id="16" presetID="10" presetClass="entr" presetSubtype="0" fill="hold" nodeType="clickEffect">
+                                  <p:stCondLst>
+                                    <p:cond delay="0"/>
+                                  </p:stCondLst>
+                                  <p:childTnLst>
+                                    <p:set>
+                                      <p:cBhvr>
+                                        <p:cTn id="17" dur="1" fill="hold">
+                                          <p:stCondLst>
+                                            <p:cond delay="0"/>
+                                          </p:stCondLst>
+                                        </p:cTn>
+                                        <p:tgtEl>
+                                          <p:spTgt spid="537606">
+                                            <p:txEl>
+                                              <p:pRg st="11" end="11"/>
+                                            </p:txEl>
+                                          </p:spTgt>
+                                        </p:tgtEl>
+                                        <p:attrNameLst>
+                                          <p:attrName>style.visibility</p:attrName>
+                                        </p:attrNameLst>
+                                      </p:cBhvr>
+                                      <p:to>
+                                        <p:strVal val="visible"/>
+                                      </p:to>
+                                    </p:set>
+                                    <p:animEffect transition="in" filter="fade">
+                                      <p:cBhvr>
+                                        <p:cTn id="18" dur="1000"/>
+                                        <p:tgtEl>
+                                          <p:spTgt spid="537606">
+                                            <p:txEl>
+                                              <p:pRg st="11" end="11"/>
+                                            </p:txEl>
+                                          </p:spTgt>
+                                        </p:tgtEl>
+                                      </p:cBhvr>
+                                    </p:animEffect>
+                                  </p:childTnLst>
+                                </p:cTn>
+                              </p:par>
+                              <p:par>
+                                <p:cTn id="19" presetID="10" presetClass="entr" presetSubtype="0" fill="hold" nodeType="withEffect">
                                   <p:stCondLst>
                                     <p:cond delay="0"/>
                                   </p:stCondLst>
@@ -23029,9 +23166,9 @@
                                           </p:stCondLst>
                                         </p:cTn>
                                         <p:tgtEl>
-                                          <p:spTgt spid="539654">
+                                          <p:spTgt spid="537606">
                                             <p:txEl>
-                                              <p:pRg st="6" end="6"/>
+                                              <p:pRg st="12" end="12"/>
                                             </p:txEl>
                                           </p:spTgt>
                                         </p:tgtEl>
@@ -23047,52 +23184,9 @@
                                       <p:cBhvr>
                                         <p:cTn id="21" dur="1000"/>
                                         <p:tgtEl>
-                                          <p:spTgt spid="539654">
+                                          <p:spTgt spid="537606">
                                             <p:txEl>
-                                              <p:pRg st="6" end="6"/>
-                                            </p:txEl>
-                                          </p:spTgt>
-                                        </p:tgtEl>
-                                      </p:cBhvr>
-                                    </p:animEffect>
-                                  </p:childTnLst>
-                                </p:cTn>
-                              </p:par>
-                              <p:par>
-                                <p:cTn id="22" presetID="10" presetClass="entr" presetSubtype="0" fill="hold" nodeType="withEffect">
-                                  <p:stCondLst>
-                                    <p:cond delay="0"/>
-                                  </p:stCondLst>
-                                  <p:childTnLst>
-                                    <p:set>
-                                      <p:cBhvr>
-                                        <p:cTn id="23" dur="1" fill="hold">
-                                          <p:stCondLst>
-                                            <p:cond delay="0"/>
-                                          </p:stCondLst>
-                                        </p:cTn>
-                                        <p:tgtEl>
-                                          <p:spTgt spid="539654">
-                                            <p:txEl>
-                                              <p:pRg st="7" end="7"/>
-                                            </p:txEl>
-                                          </p:spTgt>
-                                        </p:tgtEl>
-                                        <p:attrNameLst>
-                                          <p:attrName>style.visibility</p:attrName>
-                                        </p:attrNameLst>
-                                      </p:cBhvr>
-                                      <p:to>
-                                        <p:strVal val="visible"/>
-                                      </p:to>
-                                    </p:set>
-                                    <p:animEffect transition="in" filter="fade">
-                                      <p:cBhvr>
-                                        <p:cTn id="24" dur="1000"/>
-                                        <p:tgtEl>
-                                          <p:spTgt spid="539654">
-                                            <p:txEl>
-                                              <p:pRg st="7" end="7"/>
+                                              <p:pRg st="12" end="12"/>
                                             </p:txEl>
                                           </p:spTgt>
                                         </p:tgtEl>
@@ -23168,8 +23262,13 @@
           <a:p>
             <a:r>
               <a:rPr lang="de-DE" dirty="0"/>
-              <a:t>Beziehungen zwischen Klassen</a:t>
-            </a:r>
+              <a:t>Beziehungen zwischen </a:t>
+            </a:r>
+            <a:r>
+              <a:rPr lang="de-DE" dirty="0" smtClean="0"/>
+              <a:t>Klassen I</a:t>
+            </a:r>
+            <a:endParaRPr lang="de-DE" dirty="0"/>
           </a:p>
         </p:txBody>
       </p:sp>
@@ -23197,8 +23296,12 @@
               <a:buNone/>
             </a:pPr>
             <a:r>
+              <a:rPr lang="de-DE" i="1" dirty="0" smtClean="0"/>
+              <a:t>Weitere </a:t>
+            </a:r>
+            <a:r>
               <a:rPr lang="de-DE" i="1" dirty="0"/>
-              <a:t>Zusätzliche Verantwortlichkeiten können entdeckt werden, indem wir die Beziehungen zwischen Klassen untersuchen:</a:t>
+              <a:t>Verantwortlichkeiten können entdeckt werden, indem wir die Beziehungen zwischen Klassen untersuchen:</a:t>
             </a:r>
           </a:p>
           <a:p>
@@ -23313,7 +23416,15 @@
             </a:r>
             <a:r>
               <a:rPr lang="de-DE" sz="2000" dirty="0"/>
-              <a:t> Tool folgendes tun:</a:t>
+              <a:t> Tool </a:t>
+            </a:r>
+            <a:r>
+              <a:rPr lang="de-DE" sz="2000" dirty="0" smtClean="0"/>
+              <a:t>Folgendes </a:t>
+            </a:r>
+            <a:r>
+              <a:rPr lang="de-DE" sz="2000" dirty="0"/>
+              <a:t>tun:</a:t>
             </a:r>
           </a:p>
           <a:p>
@@ -23427,12 +23538,12 @@
               <a:t>	</a:t>
             </a:r>
             <a:r>
-              <a:rPr lang="de-DE" sz="2000" i="1" dirty="0" err="1">
+              <a:rPr lang="de-DE" sz="2000" i="1" dirty="0" smtClean="0">
                 <a:solidFill>
                   <a:srgbClr val="7F0101"/>
                 </a:solidFill>
               </a:rPr>
-              <a:t>generic</a:t>
+              <a:t>dynamisch</a:t>
             </a:r>
             <a:endParaRPr lang="de-DE" sz="2000" dirty="0"/>
           </a:p>
@@ -23805,8 +23916,13 @@
           <a:p>
             <a:r>
               <a:rPr lang="de-DE" dirty="0"/>
-              <a:t>Beziehungen zwischen Klassen ...</a:t>
-            </a:r>
+              <a:t>Beziehungen zwischen Klassen </a:t>
+            </a:r>
+            <a:r>
+              <a:rPr lang="de-DE" dirty="0" smtClean="0"/>
+              <a:t>II</a:t>
+            </a:r>
+            <a:endParaRPr lang="de-DE" dirty="0"/>
           </a:p>
         </p:txBody>
       </p:sp>
@@ -23955,7 +24071,11 @@
             </a:pPr>
             <a:r>
               <a:rPr lang="de-DE" sz="2000" b="1" i="1" dirty="0"/>
-              <a:t>Schwierigkeiten bei der Zuweisung von Verantwortlichkeiten weisen auf:</a:t>
+              <a:t>Schwierigkeiten bei der </a:t>
+            </a:r>
+            <a:r>
+              <a:rPr lang="de-DE" sz="2000" b="1" i="1" dirty="0" smtClean="0"/>
+              <a:t>Zuweisung:</a:t>
             </a:r>
             <a:endParaRPr lang="de-DE" dirty="0"/>
           </a:p>
@@ -25778,30 +25898,6 @@
       </p:grpSpPr>
       <p:sp>
         <p:nvSpPr>
-          <p:cNvPr id="553989" name="Rectangle 2"/>
-          <p:cNvSpPr>
-            <a:spLocks noGrp="1" noChangeArrowheads="1"/>
-          </p:cNvSpPr>
-          <p:nvPr>
-            <p:ph type="title"/>
-          </p:nvPr>
-        </p:nvSpPr>
-        <p:spPr/>
-        <p:txBody>
-          <a:bodyPr vert="horz" lIns="0" tIns="0" rIns="0" bIns="0" rtlCol="0" anchor="ctr">
-            <a:noAutofit/>
-          </a:bodyPr>
-          <a:lstStyle/>
-          <a:p>
-            <a:r>
-              <a:rPr lang="de-DE" dirty="0"/>
-              <a:t>Auflistung der Kollaborationen</a:t>
-            </a:r>
-          </a:p>
-        </p:txBody>
-      </p:sp>
-      <p:sp>
-        <p:nvSpPr>
           <p:cNvPr id="3" name="Foliennummernplatzhalter 2"/>
           <p:cNvSpPr>
             <a:spLocks noGrp="1"/>
@@ -25838,6 +25934,30 @@
                 </a:prstClr>
               </a:solidFill>
             </a:endParaRPr>
+          </a:p>
+        </p:txBody>
+      </p:sp>
+      <p:sp>
+        <p:nvSpPr>
+          <p:cNvPr id="553989" name="Rectangle 2"/>
+          <p:cNvSpPr>
+            <a:spLocks noGrp="1" noChangeArrowheads="1"/>
+          </p:cNvSpPr>
+          <p:nvPr>
+            <p:ph type="title"/>
+          </p:nvPr>
+        </p:nvSpPr>
+        <p:spPr/>
+        <p:txBody>
+          <a:bodyPr vert="horz" lIns="0" tIns="0" rIns="0" bIns="0" rtlCol="0" anchor="ctr">
+            <a:noAutofit/>
+          </a:bodyPr>
+          <a:lstStyle/>
+          <a:p>
+            <a:r>
+              <a:rPr lang="de-DE" dirty="0"/>
+              <a:t>Auflistung der Kollaborationen</a:t>
+            </a:r>
           </a:p>
         </p:txBody>
       </p:sp>
@@ -26694,6 +26814,13 @@
   <p:clrMapOvr>
     <a:masterClrMapping/>
   </p:clrMapOvr>
+  <p:timing>
+    <p:tnLst>
+      <p:par>
+        <p:cTn id="1" dur="indefinite" restart="never" nodeType="tmRoot"/>
+      </p:par>
+    </p:tnLst>
+  </p:timing>
 </p:sld>
 </file>
 
@@ -26962,6 +27089,13 @@
   <p:clrMapOvr>
     <a:masterClrMapping/>
   </p:clrMapOvr>
+  <p:timing>
+    <p:tnLst>
+      <p:par>
+        <p:cTn id="1" dur="indefinite" restart="never" nodeType="tmRoot"/>
+      </p:par>
+    </p:tnLst>
+  </p:timing>
 </p:sld>
 </file>
 
@@ -27569,12 +27703,7 @@
             <p:ph idx="1"/>
           </p:nvPr>
         </p:nvSpPr>
-        <p:spPr>
-          <a:xfrm>
-            <a:off x="1981200" y="1829916"/>
-            <a:ext cx="8651304" cy="5127476"/>
-          </a:xfrm>
-        </p:spPr>
+        <p:spPr/>
         <p:txBody>
           <a:bodyPr vert="horz" lIns="0" tIns="0" rIns="0" bIns="0" rtlCol="0">
             <a:normAutofit/>
@@ -27679,8 +27808,8 @@
         </p:blipFill>
         <p:spPr bwMode="auto">
           <a:xfrm>
-            <a:off x="3124200" y="2978944"/>
-            <a:ext cx="5791200" cy="2754313"/>
+            <a:off x="2305608" y="3218908"/>
+            <a:ext cx="7318784" cy="3480837"/>
           </a:xfrm>
           <a:prstGeom prst="rect">
             <a:avLst/>
@@ -27791,7 +27920,7 @@
         </p:nvSpPr>
         <p:spPr bwMode="auto">
           <a:xfrm>
-            <a:off x="5735960" y="5968409"/>
+            <a:off x="6672064" y="3744466"/>
             <a:ext cx="4721696" cy="685800"/>
           </a:xfrm>
           <a:prstGeom prst="foldedCorner">
@@ -27800,7 +27929,7 @@
             </a:avLst>
           </a:prstGeom>
           <a:solidFill>
-            <a:srgbClr val="00B0F0"/>
+            <a:srgbClr val="FFC90E"/>
           </a:solidFill>
           <a:ln w="9525">
             <a:solidFill>
@@ -27828,18 +27957,38 @@
               <a:buSzPct val="85000"/>
             </a:pPr>
             <a:r>
-              <a:rPr lang="de-DE" b="0" i="1" dirty="0">
-                <a:solidFill>
-                  <a:srgbClr val="7F0101"/>
+              <a:rPr lang="de-DE" dirty="0">
+                <a:solidFill>
+                  <a:srgbClr val="AB9DDB"/>
                 </a:solidFill>
                 <a:latin typeface="Helvetica" pitchFamily="34" charset="0"/>
                 <a:ea typeface="ＭＳ Ｐゴシック" pitchFamily="34" charset="-128"/>
               </a:rPr>
-              <a:t>Vorsicht vor zu voreiliger Klassifizierung! Eure Hierarchie wird evolvieren!</a:t>
-            </a:r>
-            <a:endParaRPr lang="de-DE" sz="2400" b="0" dirty="0">
+              <a:t>Vorsicht vor zu voreiliger Klassifizierung! </a:t>
+            </a:r>
+            <a:r>
+              <a:rPr lang="de-DE" dirty="0" smtClean="0">
+                <a:solidFill>
+                  <a:srgbClr val="AB9DDB"/>
+                </a:solidFill>
+                <a:latin typeface="Helvetica" pitchFamily="34" charset="0"/>
+                <a:ea typeface="ＭＳ Ｐゴシック" pitchFamily="34" charset="-128"/>
+              </a:rPr>
+              <a:t>Die </a:t>
+            </a:r>
+            <a:r>
+              <a:rPr lang="de-DE" dirty="0">
+                <a:solidFill>
+                  <a:srgbClr val="AB9DDB"/>
+                </a:solidFill>
+                <a:latin typeface="Helvetica" pitchFamily="34" charset="0"/>
+                <a:ea typeface="ＭＳ Ｐゴシック" pitchFamily="34" charset="-128"/>
+              </a:rPr>
+              <a:t>Hierarchie wird evolvieren!</a:t>
+            </a:r>
+            <a:endParaRPr lang="de-DE" sz="2400" dirty="0">
               <a:solidFill>
-                <a:schemeClr val="tx1"/>
+                <a:srgbClr val="AB9DDB"/>
               </a:solidFill>
               <a:latin typeface="Helvetica" pitchFamily="34" charset="0"/>
               <a:ea typeface="ＭＳ Ｐゴシック" pitchFamily="34" charset="-128"/>
@@ -28142,217 +28291,6 @@
           <a:chExt cx="0" cy="0"/>
         </a:xfrm>
       </p:grpSpPr>
-      <p:sp>
-        <p:nvSpPr>
-          <p:cNvPr id="560133" name="Rectangle 2"/>
-          <p:cNvSpPr>
-            <a:spLocks noGrp="1" noChangeArrowheads="1"/>
-          </p:cNvSpPr>
-          <p:nvPr>
-            <p:ph type="title"/>
-          </p:nvPr>
-        </p:nvSpPr>
-        <p:spPr/>
-        <p:txBody>
-          <a:bodyPr vert="horz" lIns="0" tIns="0" rIns="0" bIns="0" rtlCol="0" anchor="ctr">
-            <a:noAutofit/>
-          </a:bodyPr>
-          <a:lstStyle/>
-          <a:p>
-            <a:r>
-              <a:rPr lang="de-DE" dirty="0"/>
-              <a:t>Teilen von Verantwortlichkeiten</a:t>
-            </a:r>
-          </a:p>
-        </p:txBody>
-      </p:sp>
-      <p:sp>
-        <p:nvSpPr>
-          <p:cNvPr id="560134" name="Rectangle 3"/>
-          <p:cNvSpPr>
-            <a:spLocks noGrp="1" noChangeArrowheads="1"/>
-          </p:cNvSpPr>
-          <p:nvPr>
-            <p:ph idx="1"/>
-          </p:nvPr>
-        </p:nvSpPr>
-        <p:spPr>
-          <a:xfrm>
-            <a:off x="1981200" y="1600200"/>
-            <a:ext cx="5482952" cy="5127476"/>
-          </a:xfrm>
-        </p:spPr>
-        <p:txBody>
-          <a:bodyPr vert="horz" lIns="0" tIns="0" rIns="0" bIns="0" rtlCol="0">
-            <a:normAutofit/>
-          </a:bodyPr>
-          <a:lstStyle/>
-          <a:p>
-            <a:pPr marL="0" indent="0">
-              <a:lnSpc>
-                <a:spcPct val="90000"/>
-              </a:lnSpc>
-              <a:buNone/>
-            </a:pPr>
-            <a:r>
-              <a:rPr lang="de-DE" u="sng" dirty="0"/>
-              <a:t>Konkreten Klassen</a:t>
-            </a:r>
-            <a:r>
-              <a:rPr lang="de-DE" dirty="0"/>
-              <a:t> kann man instanziieren und von ihnen erben.</a:t>
-            </a:r>
-          </a:p>
-          <a:p>
-            <a:pPr marL="0" indent="0">
-              <a:lnSpc>
-                <a:spcPct val="90000"/>
-              </a:lnSpc>
-              <a:buNone/>
-            </a:pPr>
-            <a:r>
-              <a:rPr lang="de-DE" dirty="0"/>
-              <a:t>Von </a:t>
-            </a:r>
-            <a:r>
-              <a:rPr lang="de-DE" u="sng" dirty="0"/>
-              <a:t>abstrakten Klassen</a:t>
-            </a:r>
-            <a:r>
-              <a:rPr lang="de-DE" dirty="0"/>
-              <a:t> kann man nur erben.</a:t>
-            </a:r>
-          </a:p>
-          <a:p>
-            <a:pPr marL="0" indent="0">
-              <a:lnSpc>
-                <a:spcPct val="90000"/>
-              </a:lnSpc>
-              <a:buNone/>
-            </a:pPr>
-            <a:endParaRPr lang="de-DE" dirty="0"/>
-          </a:p>
-          <a:p>
-            <a:pPr marL="0" indent="0">
-              <a:lnSpc>
-                <a:spcPct val="90000"/>
-              </a:lnSpc>
-              <a:buNone/>
-            </a:pPr>
-            <a:r>
-              <a:rPr lang="de-DE" i="1" dirty="0">
-                <a:solidFill>
-                  <a:srgbClr val="7F0101"/>
-                </a:solidFill>
-              </a:rPr>
-              <a:t>Notiere Abstraktheit in Klassendiagrammen.</a:t>
-            </a:r>
-          </a:p>
-          <a:p>
-            <a:pPr marL="0" indent="0">
-              <a:lnSpc>
-                <a:spcPct val="90000"/>
-              </a:lnSpc>
-              <a:buNone/>
-            </a:pPr>
-            <a:endParaRPr lang="de-DE" dirty="0"/>
-          </a:p>
-          <a:p>
-            <a:pPr marL="0" indent="0">
-              <a:lnSpc>
-                <a:spcPct val="90000"/>
-              </a:lnSpc>
-              <a:buNone/>
-            </a:pPr>
-            <a:r>
-              <a:rPr lang="de-DE" i="1" dirty="0" err="1">
-                <a:solidFill>
-                  <a:srgbClr val="7F0101"/>
-                </a:solidFill>
-              </a:rPr>
-              <a:t>Venn</a:t>
-            </a:r>
-            <a:r>
-              <a:rPr lang="de-DE" i="1" dirty="0">
-                <a:solidFill>
-                  <a:srgbClr val="7F0101"/>
-                </a:solidFill>
-              </a:rPr>
-              <a:t> </a:t>
-            </a:r>
-            <a:r>
-              <a:rPr lang="de-DE" i="1" dirty="0" err="1">
-                <a:solidFill>
-                  <a:srgbClr val="7F0101"/>
-                </a:solidFill>
-              </a:rPr>
-              <a:t>Diagrams</a:t>
-            </a:r>
-            <a:r>
-              <a:rPr lang="de-DE" dirty="0"/>
-              <a:t> können für die Visualisierung von geteilten Verantwortlichkeiten verwendet werden.</a:t>
-            </a:r>
-          </a:p>
-          <a:p>
-            <a:pPr marL="0" indent="0">
-              <a:lnSpc>
-                <a:spcPct val="90000"/>
-              </a:lnSpc>
-              <a:buNone/>
-            </a:pPr>
-            <a:r>
-              <a:rPr lang="de-DE" i="1" dirty="0">
-                <a:solidFill>
-                  <a:srgbClr val="7F0101"/>
-                </a:solidFill>
-              </a:rPr>
-              <a:t>(Achtung: nicht Teil von UML!)</a:t>
-            </a:r>
-            <a:endParaRPr lang="de-DE" dirty="0"/>
-          </a:p>
-        </p:txBody>
-      </p:sp>
-      <p:sp>
-        <p:nvSpPr>
-          <p:cNvPr id="2" name="Foliennummernplatzhalter 1"/>
-          <p:cNvSpPr>
-            <a:spLocks noGrp="1"/>
-          </p:cNvSpPr>
-          <p:nvPr>
-            <p:ph type="sldNum" sz="quarter" idx="12"/>
-          </p:nvPr>
-        </p:nvSpPr>
-        <p:spPr/>
-        <p:txBody>
-          <a:bodyPr/>
-          <a:lstStyle/>
-          <a:p>
-            <a:pPr>
-              <a:defRPr/>
-            </a:pPr>
-            <a:fld id="{C0B85308-4B91-4084-B5EB-6B176834447A}" type="slidenum">
-              <a:rPr lang="de-DE" smtClean="0">
-                <a:solidFill>
-                  <a:prstClr val="black">
-                    <a:tint val="75000"/>
-                  </a:prstClr>
-                </a:solidFill>
-              </a:rPr>
-              <a:pPr>
-                <a:defRPr/>
-              </a:pPr>
-              <a:t>41</a:t>
-            </a:fld>
-            <a:endParaRPr lang="de-DE">
-              <a:solidFill>
-                <a:prstClr val="black">
-                  <a:tint val="75000"/>
-                </a:prstClr>
-              </a:solidFill>
-            </a:endParaRPr>
-          </a:p>
-        </p:txBody>
-      </p:sp>
       <p:pic>
         <p:nvPicPr>
           <p:cNvPr id="560135" name="Picture 4"/>
@@ -28376,7 +28314,7 @@
         </p:blipFill>
         <p:spPr bwMode="auto">
           <a:xfrm>
-            <a:off x="7004051" y="1772816"/>
+            <a:off x="8400256" y="2276872"/>
             <a:ext cx="3656013" cy="4114800"/>
           </a:xfrm>
           <a:prstGeom prst="rect">
@@ -28407,6 +28345,216 @@
           </a:extLst>
         </p:spPr>
       </p:pic>
+      <p:sp>
+        <p:nvSpPr>
+          <p:cNvPr id="560133" name="Rectangle 2"/>
+          <p:cNvSpPr>
+            <a:spLocks noGrp="1" noChangeArrowheads="1"/>
+          </p:cNvSpPr>
+          <p:nvPr>
+            <p:ph type="title"/>
+          </p:nvPr>
+        </p:nvSpPr>
+        <p:spPr/>
+        <p:txBody>
+          <a:bodyPr vert="horz" lIns="0" tIns="0" rIns="0" bIns="0" rtlCol="0" anchor="ctr">
+            <a:noAutofit/>
+          </a:bodyPr>
+          <a:lstStyle/>
+          <a:p>
+            <a:r>
+              <a:rPr lang="de-DE" dirty="0"/>
+              <a:t>Teilen von Verantwortlichkeiten</a:t>
+            </a:r>
+          </a:p>
+        </p:txBody>
+      </p:sp>
+      <p:sp>
+        <p:nvSpPr>
+          <p:cNvPr id="560134" name="Rectangle 3"/>
+          <p:cNvSpPr>
+            <a:spLocks noGrp="1" noChangeArrowheads="1"/>
+          </p:cNvSpPr>
+          <p:nvPr>
+            <p:ph idx="1"/>
+          </p:nvPr>
+        </p:nvSpPr>
+        <p:spPr/>
+        <p:txBody>
+          <a:bodyPr vert="horz" lIns="0" tIns="0" rIns="0" bIns="0" rtlCol="0">
+            <a:normAutofit/>
+          </a:bodyPr>
+          <a:lstStyle/>
+          <a:p>
+            <a:pPr marL="0" indent="0">
+              <a:lnSpc>
+                <a:spcPct val="90000"/>
+              </a:lnSpc>
+              <a:buNone/>
+            </a:pPr>
+            <a:r>
+              <a:rPr lang="de-DE" u="sng" dirty="0"/>
+              <a:t>Konkreten Klassen</a:t>
+            </a:r>
+            <a:r>
+              <a:rPr lang="de-DE" dirty="0"/>
+              <a:t> kann man instanziieren und von ihnen erben.</a:t>
+            </a:r>
+          </a:p>
+          <a:p>
+            <a:pPr marL="0" indent="0">
+              <a:lnSpc>
+                <a:spcPct val="90000"/>
+              </a:lnSpc>
+              <a:buNone/>
+            </a:pPr>
+            <a:r>
+              <a:rPr lang="de-DE" dirty="0"/>
+              <a:t>Von </a:t>
+            </a:r>
+            <a:r>
+              <a:rPr lang="de-DE" u="sng" dirty="0"/>
+              <a:t>abstrakten Klassen</a:t>
+            </a:r>
+            <a:r>
+              <a:rPr lang="de-DE" dirty="0"/>
+              <a:t> kann man nur erben.</a:t>
+            </a:r>
+          </a:p>
+          <a:p>
+            <a:pPr marL="0" indent="0">
+              <a:lnSpc>
+                <a:spcPct val="90000"/>
+              </a:lnSpc>
+              <a:buNone/>
+            </a:pPr>
+            <a:endParaRPr lang="de-DE" dirty="0"/>
+          </a:p>
+          <a:p>
+            <a:pPr marL="0" indent="0">
+              <a:lnSpc>
+                <a:spcPct val="90000"/>
+              </a:lnSpc>
+              <a:buNone/>
+            </a:pPr>
+            <a:r>
+              <a:rPr lang="de-DE" i="1" dirty="0">
+                <a:solidFill>
+                  <a:srgbClr val="7F0101"/>
+                </a:solidFill>
+              </a:rPr>
+              <a:t>Notiere Abstraktheit in Klassendiagrammen.</a:t>
+            </a:r>
+          </a:p>
+          <a:p>
+            <a:pPr marL="0" indent="0">
+              <a:lnSpc>
+                <a:spcPct val="90000"/>
+              </a:lnSpc>
+              <a:buNone/>
+            </a:pPr>
+            <a:endParaRPr lang="de-DE" dirty="0"/>
+          </a:p>
+          <a:p>
+            <a:pPr marL="0" indent="0">
+              <a:lnSpc>
+                <a:spcPct val="90000"/>
+              </a:lnSpc>
+              <a:buNone/>
+            </a:pPr>
+            <a:r>
+              <a:rPr lang="de-DE" i="1" dirty="0" err="1">
+                <a:solidFill>
+                  <a:srgbClr val="7F0101"/>
+                </a:solidFill>
+              </a:rPr>
+              <a:t>Venn</a:t>
+            </a:r>
+            <a:r>
+              <a:rPr lang="de-DE" i="1" dirty="0">
+                <a:solidFill>
+                  <a:srgbClr val="7F0101"/>
+                </a:solidFill>
+              </a:rPr>
+              <a:t> </a:t>
+            </a:r>
+            <a:r>
+              <a:rPr lang="de-DE" i="1" dirty="0" smtClean="0">
+                <a:solidFill>
+                  <a:srgbClr val="7F0101"/>
+                </a:solidFill>
+              </a:rPr>
+              <a:t>Diagramme</a:t>
+            </a:r>
+            <a:r>
+              <a:rPr lang="de-DE" dirty="0" smtClean="0"/>
+              <a:t> </a:t>
+            </a:r>
+            <a:r>
+              <a:rPr lang="de-DE" dirty="0"/>
+              <a:t>können für die Visualisierung von geteilten Verantwortlichkeiten verwendet werden.</a:t>
+            </a:r>
+          </a:p>
+          <a:p>
+            <a:pPr marL="0" indent="0">
+              <a:lnSpc>
+                <a:spcPct val="90000"/>
+              </a:lnSpc>
+              <a:buNone/>
+            </a:pPr>
+            <a:r>
+              <a:rPr lang="de-DE" i="1" dirty="0">
+                <a:solidFill>
+                  <a:srgbClr val="7F0101"/>
+                </a:solidFill>
+              </a:rPr>
+              <a:t>(Achtung: nicht Teil von UML!)</a:t>
+            </a:r>
+            <a:endParaRPr lang="de-DE" dirty="0"/>
+          </a:p>
+        </p:txBody>
+      </p:sp>
+      <p:sp>
+        <p:nvSpPr>
+          <p:cNvPr id="2" name="Foliennummernplatzhalter 1"/>
+          <p:cNvSpPr>
+            <a:spLocks noGrp="1"/>
+          </p:cNvSpPr>
+          <p:nvPr>
+            <p:ph type="sldNum" sz="quarter" idx="12"/>
+          </p:nvPr>
+        </p:nvSpPr>
+        <p:spPr/>
+        <p:txBody>
+          <a:bodyPr/>
+          <a:lstStyle/>
+          <a:p>
+            <a:pPr>
+              <a:defRPr/>
+            </a:pPr>
+            <a:fld id="{C0B85308-4B91-4084-B5EB-6B176834447A}" type="slidenum">
+              <a:rPr lang="de-DE" smtClean="0">
+                <a:solidFill>
+                  <a:prstClr val="black">
+                    <a:tint val="75000"/>
+                  </a:prstClr>
+                </a:solidFill>
+              </a:rPr>
+              <a:pPr>
+                <a:defRPr/>
+              </a:pPr>
+              <a:t>41</a:t>
+            </a:fld>
+            <a:endParaRPr lang="de-DE">
+              <a:solidFill>
+                <a:prstClr val="black">
+                  <a:tint val="75000"/>
+                </a:prstClr>
+              </a:solidFill>
+            </a:endParaRPr>
+          </a:p>
+        </p:txBody>
+      </p:sp>
     </p:spTree>
   </p:cSld>
   <p:clrMapOvr>
@@ -28627,187 +28775,6 @@
           <a:chExt cx="0" cy="0"/>
         </a:xfrm>
       </p:grpSpPr>
-      <p:sp>
-        <p:nvSpPr>
-          <p:cNvPr id="562181" name="Rectangle 2"/>
-          <p:cNvSpPr>
-            <a:spLocks noGrp="1" noChangeArrowheads="1"/>
-          </p:cNvSpPr>
-          <p:nvPr>
-            <p:ph type="title"/>
-          </p:nvPr>
-        </p:nvSpPr>
-        <p:spPr/>
-        <p:txBody>
-          <a:bodyPr vert="horz" lIns="0" tIns="0" rIns="0" bIns="0" rtlCol="0" anchor="ctr">
-            <a:noAutofit/>
-          </a:bodyPr>
-          <a:lstStyle/>
-          <a:p>
-            <a:r>
-              <a:rPr lang="de-DE" dirty="0"/>
-              <a:t>Mehrfachvererbung</a:t>
-            </a:r>
-          </a:p>
-        </p:txBody>
-      </p:sp>
-      <p:sp>
-        <p:nvSpPr>
-          <p:cNvPr id="562182" name="Rectangle 3"/>
-          <p:cNvSpPr>
-            <a:spLocks noGrp="1" noChangeArrowheads="1"/>
-          </p:cNvSpPr>
-          <p:nvPr>
-            <p:ph idx="1"/>
-          </p:nvPr>
-        </p:nvSpPr>
-        <p:spPr>
-          <a:xfrm>
-            <a:off x="1981200" y="1600200"/>
-            <a:ext cx="4258816" cy="5127476"/>
-          </a:xfrm>
-        </p:spPr>
-        <p:txBody>
-          <a:bodyPr vert="horz" lIns="0" tIns="0" rIns="0" bIns="0" rtlCol="0">
-            <a:normAutofit/>
-          </a:bodyPr>
-          <a:lstStyle/>
-          <a:p>
-            <a:pPr marL="0" indent="0">
-              <a:buNone/>
-            </a:pPr>
-            <a:r>
-              <a:rPr lang="de-DE" dirty="0"/>
-              <a:t>Bestimme, ob eine Klasse </a:t>
-            </a:r>
-            <a:r>
-              <a:rPr lang="de-DE" i="1" dirty="0">
-                <a:solidFill>
-                  <a:srgbClr val="7F0101"/>
-                </a:solidFill>
-              </a:rPr>
-              <a:t>instanziiert</a:t>
-            </a:r>
-            <a:r>
-              <a:rPr lang="de-DE" dirty="0"/>
-              <a:t> wird, um zu entscheiden ob sie </a:t>
-            </a:r>
-            <a:r>
-              <a:rPr lang="de-DE" i="1" dirty="0">
-                <a:solidFill>
-                  <a:srgbClr val="7F0101"/>
-                </a:solidFill>
-              </a:rPr>
-              <a:t>abstrakt oder konkret </a:t>
-            </a:r>
-            <a:r>
-              <a:rPr lang="de-DE" dirty="0"/>
-              <a:t>ist.</a:t>
-            </a:r>
-          </a:p>
-          <a:p>
-            <a:pPr marL="0" indent="0">
-              <a:buNone/>
-            </a:pPr>
-            <a:endParaRPr lang="de-DE" dirty="0"/>
-          </a:p>
-          <a:p>
-            <a:pPr marL="0" indent="0">
-              <a:buNone/>
-            </a:pPr>
-            <a:r>
-              <a:rPr lang="de-DE" dirty="0"/>
-              <a:t>Verantwortlichkeiten von Subklassen sind  </a:t>
-            </a:r>
-            <a:r>
-              <a:rPr lang="de-DE" i="1" dirty="0">
-                <a:solidFill>
-                  <a:srgbClr val="7F0101"/>
-                </a:solidFill>
-              </a:rPr>
-              <a:t>größer</a:t>
-            </a:r>
-            <a:r>
-              <a:rPr lang="de-DE" dirty="0"/>
-              <a:t> als diese von </a:t>
-            </a:r>
-            <a:r>
-              <a:rPr lang="de-DE" i="1" dirty="0">
-                <a:solidFill>
-                  <a:srgbClr val="7F0101"/>
-                </a:solidFill>
-              </a:rPr>
-              <a:t>Oberklassen.</a:t>
-            </a:r>
-            <a:endParaRPr lang="de-DE" dirty="0"/>
-          </a:p>
-          <a:p>
-            <a:pPr marL="0" indent="0">
-              <a:buNone/>
-            </a:pPr>
-            <a:endParaRPr lang="de-DE" dirty="0"/>
-          </a:p>
-          <a:p>
-            <a:pPr marL="0" indent="0">
-              <a:buNone/>
-            </a:pPr>
-            <a:r>
-              <a:rPr lang="de-DE" dirty="0"/>
-              <a:t>Überschneidungen repräsentieren </a:t>
-            </a:r>
-            <a:r>
-              <a:rPr lang="de-DE" i="1" dirty="0">
-                <a:solidFill>
-                  <a:srgbClr val="7F0101"/>
-                </a:solidFill>
-              </a:rPr>
-              <a:t>gemeinsame Oberklassen.</a:t>
-            </a:r>
-            <a:endParaRPr lang="de-DE" dirty="0"/>
-          </a:p>
-        </p:txBody>
-      </p:sp>
-      <p:sp>
-        <p:nvSpPr>
-          <p:cNvPr id="2" name="Foliennummernplatzhalter 1"/>
-          <p:cNvSpPr>
-            <a:spLocks noGrp="1"/>
-          </p:cNvSpPr>
-          <p:nvPr>
-            <p:ph type="sldNum" sz="quarter" idx="12"/>
-          </p:nvPr>
-        </p:nvSpPr>
-        <p:spPr/>
-        <p:txBody>
-          <a:bodyPr/>
-          <a:lstStyle/>
-          <a:p>
-            <a:pPr>
-              <a:defRPr/>
-            </a:pPr>
-            <a:fld id="{C0B85308-4B91-4084-B5EB-6B176834447A}" type="slidenum">
-              <a:rPr lang="de-DE" smtClean="0">
-                <a:solidFill>
-                  <a:prstClr val="black">
-                    <a:tint val="75000"/>
-                  </a:prstClr>
-                </a:solidFill>
-              </a:rPr>
-              <a:pPr>
-                <a:defRPr/>
-              </a:pPr>
-              <a:t>42</a:t>
-            </a:fld>
-            <a:endParaRPr lang="de-DE">
-              <a:solidFill>
-                <a:prstClr val="black">
-                  <a:tint val="75000"/>
-                </a:prstClr>
-              </a:solidFill>
-            </a:endParaRPr>
-          </a:p>
-        </p:txBody>
-      </p:sp>
       <p:pic>
         <p:nvPicPr>
           <p:cNvPr id="562183" name="Picture 4"/>
@@ -28831,7 +28798,7 @@
         </p:blipFill>
         <p:spPr bwMode="auto">
           <a:xfrm>
-            <a:off x="5794946" y="1524000"/>
+            <a:off x="7032104" y="1628800"/>
             <a:ext cx="4981575" cy="4991100"/>
           </a:xfrm>
           <a:prstGeom prst="rect">
@@ -28862,11 +28829,220 @@
           </a:extLst>
         </p:spPr>
       </p:pic>
+      <p:sp>
+        <p:nvSpPr>
+          <p:cNvPr id="562181" name="Rectangle 2"/>
+          <p:cNvSpPr>
+            <a:spLocks noGrp="1" noChangeArrowheads="1"/>
+          </p:cNvSpPr>
+          <p:nvPr>
+            <p:ph type="title"/>
+          </p:nvPr>
+        </p:nvSpPr>
+        <p:spPr/>
+        <p:txBody>
+          <a:bodyPr vert="horz" lIns="0" tIns="0" rIns="0" bIns="0" rtlCol="0" anchor="ctr">
+            <a:noAutofit/>
+          </a:bodyPr>
+          <a:lstStyle/>
+          <a:p>
+            <a:r>
+              <a:rPr lang="de-DE" dirty="0"/>
+              <a:t>Mehrfachvererbung</a:t>
+            </a:r>
+          </a:p>
+        </p:txBody>
+      </p:sp>
+      <p:sp>
+        <p:nvSpPr>
+          <p:cNvPr id="562182" name="Rectangle 3"/>
+          <p:cNvSpPr>
+            <a:spLocks noGrp="1" noChangeArrowheads="1"/>
+          </p:cNvSpPr>
+          <p:nvPr>
+            <p:ph idx="1"/>
+          </p:nvPr>
+        </p:nvSpPr>
+        <p:spPr>
+          <a:xfrm>
+            <a:off x="1631504" y="2132856"/>
+            <a:ext cx="5688632" cy="4594820"/>
+          </a:xfrm>
+        </p:spPr>
+        <p:txBody>
+          <a:bodyPr vert="horz" lIns="0" tIns="0" rIns="0" bIns="0" rtlCol="0">
+            <a:normAutofit/>
+          </a:bodyPr>
+          <a:lstStyle/>
+          <a:p>
+            <a:pPr marL="0" indent="0">
+              <a:buNone/>
+            </a:pPr>
+            <a:r>
+              <a:rPr lang="de-DE" dirty="0"/>
+              <a:t>Bestimme, ob eine Klasse </a:t>
+            </a:r>
+            <a:r>
+              <a:rPr lang="de-DE" i="1" dirty="0">
+                <a:solidFill>
+                  <a:srgbClr val="7F0101"/>
+                </a:solidFill>
+              </a:rPr>
+              <a:t>instanziiert</a:t>
+            </a:r>
+            <a:r>
+              <a:rPr lang="de-DE" dirty="0"/>
+              <a:t> wird, um zu entscheiden ob sie </a:t>
+            </a:r>
+            <a:r>
+              <a:rPr lang="de-DE" i="1" dirty="0">
+                <a:solidFill>
+                  <a:srgbClr val="7F0101"/>
+                </a:solidFill>
+              </a:rPr>
+              <a:t>abstrakt oder konkret </a:t>
+            </a:r>
+            <a:r>
+              <a:rPr lang="de-DE" dirty="0"/>
+              <a:t>ist.</a:t>
+            </a:r>
+          </a:p>
+          <a:p>
+            <a:pPr marL="0" indent="0">
+              <a:buNone/>
+            </a:pPr>
+            <a:endParaRPr lang="de-DE" dirty="0" smtClean="0"/>
+          </a:p>
+          <a:p>
+            <a:pPr marL="0" indent="0">
+              <a:buNone/>
+            </a:pPr>
+            <a:endParaRPr lang="de-DE" dirty="0"/>
+          </a:p>
+          <a:p>
+            <a:pPr marL="0" indent="0">
+              <a:buNone/>
+            </a:pPr>
+            <a:r>
+              <a:rPr lang="de-DE" dirty="0"/>
+              <a:t>Verantwortlichkeiten von Subklassen sind  </a:t>
+            </a:r>
+            <a:r>
+              <a:rPr lang="de-DE" i="1" dirty="0">
+                <a:solidFill>
+                  <a:srgbClr val="7F0101"/>
+                </a:solidFill>
+              </a:rPr>
+              <a:t>größer</a:t>
+            </a:r>
+            <a:r>
+              <a:rPr lang="de-DE" dirty="0"/>
+              <a:t> als </a:t>
+            </a:r>
+            <a:r>
+              <a:rPr lang="de-DE" dirty="0" smtClean="0"/>
+              <a:t>von </a:t>
+            </a:r>
+            <a:r>
+              <a:rPr lang="de-DE" i="1" dirty="0">
+                <a:solidFill>
+                  <a:srgbClr val="7F0101"/>
+                </a:solidFill>
+              </a:rPr>
+              <a:t>Oberklassen</a:t>
+            </a:r>
+            <a:r>
+              <a:rPr lang="de-DE" i="1" dirty="0" smtClean="0">
+                <a:solidFill>
+                  <a:srgbClr val="7F0101"/>
+                </a:solidFill>
+              </a:rPr>
+              <a:t>.</a:t>
+            </a:r>
+          </a:p>
+          <a:p>
+            <a:pPr marL="0" indent="0">
+              <a:buNone/>
+            </a:pPr>
+            <a:endParaRPr lang="de-DE" dirty="0"/>
+          </a:p>
+          <a:p>
+            <a:pPr marL="0" indent="0">
+              <a:buNone/>
+            </a:pPr>
+            <a:r>
+              <a:rPr lang="de-DE" dirty="0" smtClean="0"/>
+              <a:t>Überschneidungen </a:t>
+            </a:r>
+            <a:r>
+              <a:rPr lang="de-DE" dirty="0"/>
+              <a:t>repräsentieren </a:t>
+            </a:r>
+            <a:r>
+              <a:rPr lang="de-DE" i="1" dirty="0">
+                <a:solidFill>
+                  <a:srgbClr val="7F0101"/>
+                </a:solidFill>
+              </a:rPr>
+              <a:t>gemeinsame Oberklassen.</a:t>
+            </a:r>
+            <a:endParaRPr lang="de-DE" dirty="0"/>
+          </a:p>
+        </p:txBody>
+      </p:sp>
+      <p:sp>
+        <p:nvSpPr>
+          <p:cNvPr id="2" name="Foliennummernplatzhalter 1"/>
+          <p:cNvSpPr>
+            <a:spLocks noGrp="1"/>
+          </p:cNvSpPr>
+          <p:nvPr>
+            <p:ph type="sldNum" sz="quarter" idx="12"/>
+          </p:nvPr>
+        </p:nvSpPr>
+        <p:spPr/>
+        <p:txBody>
+          <a:bodyPr/>
+          <a:lstStyle/>
+          <a:p>
+            <a:pPr>
+              <a:defRPr/>
+            </a:pPr>
+            <a:fld id="{C0B85308-4B91-4084-B5EB-6B176834447A}" type="slidenum">
+              <a:rPr lang="de-DE" smtClean="0">
+                <a:solidFill>
+                  <a:prstClr val="black">
+                    <a:tint val="75000"/>
+                  </a:prstClr>
+                </a:solidFill>
+              </a:rPr>
+              <a:pPr>
+                <a:defRPr/>
+              </a:pPr>
+              <a:t>42</a:t>
+            </a:fld>
+            <a:endParaRPr lang="de-DE">
+              <a:solidFill>
+                <a:prstClr val="black">
+                  <a:tint val="75000"/>
+                </a:prstClr>
+              </a:solidFill>
+            </a:endParaRPr>
+          </a:p>
+        </p:txBody>
+      </p:sp>
     </p:spTree>
   </p:cSld>
   <p:clrMapOvr>
     <a:masterClrMapping/>
   </p:clrMapOvr>
+  <p:timing>
+    <p:tnLst>
+      <p:par>
+        <p:cTn id="1" dur="indefinite" restart="never" nodeType="tmRoot"/>
+      </p:par>
+    </p:tnLst>
+  </p:timing>
 </p:sld>
 </file>
 
@@ -28906,8 +29082,13 @@
           <a:p>
             <a:r>
               <a:rPr lang="de-DE" dirty="0"/>
-              <a:t>Entwerfen von Guten Hierarchien</a:t>
-            </a:r>
+              <a:t>Entwerfen von Guten </a:t>
+            </a:r>
+            <a:r>
+              <a:rPr lang="de-DE" dirty="0" smtClean="0"/>
+              <a:t>Hierarchien I</a:t>
+            </a:r>
+            <a:endParaRPr lang="de-DE" dirty="0"/>
           </a:p>
         </p:txBody>
       </p:sp>
@@ -29232,8 +29413,13 @@
             </a:r>
             <a:r>
               <a:rPr lang="en-US" dirty="0"/>
-              <a:t> …</a:t>
-            </a:r>
+              <a:t> </a:t>
+            </a:r>
+            <a:r>
+              <a:rPr lang="en-US" dirty="0" smtClean="0"/>
+              <a:t>II</a:t>
+            </a:r>
+            <a:endParaRPr lang="en-US" dirty="0"/>
           </a:p>
         </p:txBody>
       </p:sp>
@@ -29573,7 +29759,7 @@
         <p:spPr bwMode="auto">
           <a:xfrm>
             <a:off x="4367808" y="4800600"/>
-            <a:ext cx="2971800" cy="1295400"/>
+            <a:ext cx="3168352" cy="1295400"/>
           </a:xfrm>
           <a:prstGeom prst="foldedCorner">
             <a:avLst>
@@ -29581,7 +29767,7 @@
             </a:avLst>
           </a:prstGeom>
           <a:solidFill>
-            <a:srgbClr val="00B0F0"/>
+            <a:srgbClr val="FFC90E"/>
           </a:solidFill>
           <a:ln w="9525">
             <a:solidFill>
@@ -29609,16 +29795,19 @@
               <a:buSzPct val="85000"/>
             </a:pPr>
             <a:r>
-              <a:rPr lang="de-DE" sz="2400" b="0" dirty="0">
+              <a:rPr lang="de-DE" sz="2400" dirty="0">
+                <a:solidFill>
+                  <a:srgbClr val="AB9DDB"/>
+                </a:solidFill>
                 <a:latin typeface="Helvetica" pitchFamily="34" charset="0"/>
                 <a:ea typeface="ＭＳ Ｐゴシック" pitchFamily="34" charset="-128"/>
               </a:rPr>
               <a:t>C übernimmt </a:t>
             </a:r>
             <a:r>
-              <a:rPr lang="de-DE" sz="2400" b="0" i="1" dirty="0">
-                <a:solidFill>
-                  <a:srgbClr val="C00000"/>
+              <a:rPr lang="de-DE" sz="2400" i="1" dirty="0">
+                <a:solidFill>
+                  <a:srgbClr val="AB9DDB"/>
                 </a:solidFill>
                 <a:latin typeface="Helvetica" pitchFamily="34" charset="0"/>
                 <a:ea typeface="ＭＳ Ｐゴシック" pitchFamily="34" charset="-128"/>
@@ -29626,7 +29815,10 @@
               <a:t>alle</a:t>
             </a:r>
             <a:r>
-              <a:rPr lang="de-DE" sz="2400" b="0" dirty="0">
+              <a:rPr lang="de-DE" sz="2400" dirty="0">
+                <a:solidFill>
+                  <a:srgbClr val="AB9DDB"/>
+                </a:solidFill>
                 <a:latin typeface="Helvetica" pitchFamily="34" charset="0"/>
                 <a:ea typeface="ＭＳ Ｐゴシック" pitchFamily="34" charset="-128"/>
               </a:rPr>
@@ -29740,6 +29932,13 @@
   <p:clrMapOvr>
     <a:masterClrMapping/>
   </p:clrMapOvr>
+  <p:timing>
+    <p:tnLst>
+      <p:par>
+        <p:cTn id="1" dur="indefinite" restart="never" nodeType="tmRoot"/>
+      </p:par>
+    </p:tnLst>
+  </p:timing>
 </p:sld>
 </file>
 
@@ -29783,7 +29982,7 @@
         </p:blipFill>
         <p:spPr bwMode="auto">
           <a:xfrm>
-            <a:off x="5992814" y="1698626"/>
+            <a:off x="7593013" y="1772816"/>
             <a:ext cx="4598987" cy="4625975"/>
           </a:xfrm>
           <a:prstGeom prst="rect">
@@ -29858,8 +30057,8 @@
         </p:nvSpPr>
         <p:spPr>
           <a:xfrm>
-            <a:off x="1981200" y="1600200"/>
-            <a:ext cx="4474840" cy="5127476"/>
+            <a:off x="1631504" y="2132856"/>
+            <a:ext cx="5976664" cy="4594820"/>
           </a:xfrm>
         </p:spPr>
         <p:txBody>
@@ -30038,6 +30237,13 @@
   <p:clrMapOvr>
     <a:masterClrMapping/>
   </p:clrMapOvr>
+  <p:timing>
+    <p:tnLst>
+      <p:par>
+        <p:cTn id="1" dur="indefinite" restart="never" nodeType="tmRoot"/>
+      </p:par>
+    </p:tnLst>
+  </p:timing>
 </p:sld>
 </file>
 
@@ -30098,8 +30304,8 @@
         </p:nvSpPr>
         <p:spPr>
           <a:xfrm>
-            <a:off x="1703512" y="1600200"/>
-            <a:ext cx="3960440" cy="5127476"/>
+            <a:off x="1775520" y="2249860"/>
+            <a:ext cx="5400600" cy="4594820"/>
           </a:xfrm>
         </p:spPr>
         <p:txBody>
@@ -30238,7 +30444,7 @@
         </p:blipFill>
         <p:spPr bwMode="auto">
           <a:xfrm>
-            <a:off x="5591944" y="1589088"/>
+            <a:off x="6812136" y="1741488"/>
             <a:ext cx="5116512" cy="5116512"/>
           </a:xfrm>
           <a:prstGeom prst="rect">
@@ -30269,11 +30475,188 @@
           </a:extLst>
         </p:spPr>
       </p:pic>
+      <p:sp>
+        <p:nvSpPr>
+          <p:cNvPr id="3" name="Rechteck 2"/>
+          <p:cNvSpPr/>
+          <p:nvPr/>
+        </p:nvSpPr>
+        <p:spPr>
+          <a:xfrm>
+            <a:off x="6960096" y="4685680"/>
+            <a:ext cx="4576216" cy="2159000"/>
+          </a:xfrm>
+          <a:prstGeom prst="rect">
+            <a:avLst/>
+          </a:prstGeom>
+          <a:solidFill>
+            <a:schemeClr val="bg1"/>
+          </a:solidFill>
+          <a:ln>
+            <a:solidFill>
+              <a:schemeClr val="bg1"/>
+            </a:solidFill>
+          </a:ln>
+        </p:spPr>
+        <p:style>
+          <a:lnRef idx="2">
+            <a:schemeClr val="accent1">
+              <a:shade val="50000"/>
+            </a:schemeClr>
+          </a:lnRef>
+          <a:fillRef idx="1">
+            <a:schemeClr val="accent1"/>
+          </a:fillRef>
+          <a:effectRef idx="0">
+            <a:schemeClr val="accent1"/>
+          </a:effectRef>
+          <a:fontRef idx="minor">
+            <a:schemeClr val="lt1"/>
+          </a:fontRef>
+        </p:style>
+        <p:txBody>
+          <a:bodyPr rtlCol="0" anchor="ctr"/>
+          <a:lstStyle/>
+          <a:p>
+            <a:pPr algn="ctr"/>
+            <a:endParaRPr lang="en-US"/>
+          </a:p>
+        </p:txBody>
+      </p:sp>
     </p:spTree>
   </p:cSld>
   <p:clrMapOvr>
     <a:masterClrMapping/>
   </p:clrMapOvr>
+  <p:timing>
+    <p:tnLst>
+      <p:par>
+        <p:cTn id="1" dur="indefinite" restart="never" nodeType="tmRoot">
+          <p:childTnLst>
+            <p:seq concurrent="1" nextAc="seek">
+              <p:cTn id="2" dur="indefinite" nodeType="mainSeq">
+                <p:childTnLst>
+                  <p:par>
+                    <p:cTn id="3" fill="hold">
+                      <p:stCondLst>
+                        <p:cond delay="indefinite"/>
+                      </p:stCondLst>
+                      <p:childTnLst>
+                        <p:par>
+                          <p:cTn id="4" fill="hold">
+                            <p:stCondLst>
+                              <p:cond delay="0"/>
+                            </p:stCondLst>
+                            <p:childTnLst>
+                              <p:par>
+                                <p:cTn id="5" presetID="10" presetClass="exit" presetSubtype="0" fill="hold" grpId="0" nodeType="clickEffect">
+                                  <p:stCondLst>
+                                    <p:cond delay="0"/>
+                                  </p:stCondLst>
+                                  <p:childTnLst>
+                                    <p:animEffect transition="out" filter="fade">
+                                      <p:cBhvr>
+                                        <p:cTn id="6" dur="500"/>
+                                        <p:tgtEl>
+                                          <p:spTgt spid="3"/>
+                                        </p:tgtEl>
+                                      </p:cBhvr>
+                                    </p:animEffect>
+                                    <p:set>
+                                      <p:cBhvr>
+                                        <p:cTn id="7" dur="1" fill="hold">
+                                          <p:stCondLst>
+                                            <p:cond delay="499"/>
+                                          </p:stCondLst>
+                                        </p:cTn>
+                                        <p:tgtEl>
+                                          <p:spTgt spid="3"/>
+                                        </p:tgtEl>
+                                        <p:attrNameLst>
+                                          <p:attrName>style.visibility</p:attrName>
+                                        </p:attrNameLst>
+                                      </p:cBhvr>
+                                      <p:to>
+                                        <p:strVal val="hidden"/>
+                                      </p:to>
+                                    </p:set>
+                                  </p:childTnLst>
+                                </p:cTn>
+                              </p:par>
+                              <p:par>
+                                <p:cTn id="8" presetID="10" presetClass="entr" presetSubtype="0" fill="hold" nodeType="withEffect">
+                                  <p:stCondLst>
+                                    <p:cond delay="0"/>
+                                  </p:stCondLst>
+                                  <p:childTnLst>
+                                    <p:set>
+                                      <p:cBhvr>
+                                        <p:cTn id="9" dur="1" fill="hold">
+                                          <p:stCondLst>
+                                            <p:cond delay="0"/>
+                                          </p:stCondLst>
+                                        </p:cTn>
+                                        <p:tgtEl>
+                                          <p:spTgt spid="572422">
+                                            <p:txEl>
+                                              <p:pRg st="2" end="2"/>
+                                            </p:txEl>
+                                          </p:spTgt>
+                                        </p:tgtEl>
+                                        <p:attrNameLst>
+                                          <p:attrName>style.visibility</p:attrName>
+                                        </p:attrNameLst>
+                                      </p:cBhvr>
+                                      <p:to>
+                                        <p:strVal val="visible"/>
+                                      </p:to>
+                                    </p:set>
+                                    <p:animEffect transition="in" filter="fade">
+                                      <p:cBhvr>
+                                        <p:cTn id="10" dur="500"/>
+                                        <p:tgtEl>
+                                          <p:spTgt spid="572422">
+                                            <p:txEl>
+                                              <p:pRg st="2" end="2"/>
+                                            </p:txEl>
+                                          </p:spTgt>
+                                        </p:tgtEl>
+                                      </p:cBhvr>
+                                    </p:animEffect>
+                                  </p:childTnLst>
+                                </p:cTn>
+                              </p:par>
+                            </p:childTnLst>
+                          </p:cTn>
+                        </p:par>
+                      </p:childTnLst>
+                    </p:cTn>
+                  </p:par>
+                </p:childTnLst>
+              </p:cTn>
+              <p:prevCondLst>
+                <p:cond evt="onPrev" delay="0">
+                  <p:tgtEl>
+                    <p:sldTgt/>
+                  </p:tgtEl>
+                </p:cond>
+              </p:prevCondLst>
+              <p:nextCondLst>
+                <p:cond evt="onNext" delay="0">
+                  <p:tgtEl>
+                    <p:sldTgt/>
+                  </p:tgtEl>
+                </p:cond>
+              </p:nextCondLst>
+            </p:seq>
+          </p:childTnLst>
+        </p:cTn>
+      </p:par>
+    </p:tnLst>
+    <p:bldLst>
+      <p:bldP spid="3" grpId="0" animBg="1"/>
+    </p:bldLst>
+  </p:timing>
 </p:sld>
 </file>
 
@@ -30374,8 +30757,12 @@
               <a:t>Interface</a:t>
             </a:r>
             <a:r>
+              <a:rPr lang="de-DE" dirty="0" smtClean="0"/>
+              <a:t>), </a:t>
+            </a:r>
+            <a:r>
               <a:rPr lang="de-DE" dirty="0"/>
-              <a:t>) die zu einer Klasse gehören.</a:t>
+              <a:t>die zu einer Klasse gehören.</a:t>
             </a:r>
           </a:p>
           <a:p>
@@ -30735,43 +31122,6 @@
       </p:grpSpPr>
       <p:sp>
         <p:nvSpPr>
-          <p:cNvPr id="576517" name="Rectangle 4"/>
-          <p:cNvSpPr>
-            <a:spLocks noGrp="1" noChangeArrowheads="1"/>
-          </p:cNvSpPr>
-          <p:nvPr>
-            <p:ph type="title"/>
-          </p:nvPr>
-        </p:nvSpPr>
-        <p:spPr/>
-        <p:txBody>
-          <a:bodyPr vert="horz" lIns="0" tIns="0" rIns="0" bIns="0" rtlCol="0" anchor="ctr">
-            <a:noAutofit/>
-          </a:bodyPr>
-          <a:lstStyle/>
-          <a:p>
-            <a:r>
-              <a:rPr lang="de-DE" dirty="0"/>
-              <a:t>Was </a:t>
-            </a:r>
-            <a:r>
-              <a:rPr lang="de-DE" dirty="0" smtClean="0"/>
-              <a:t>Sie </a:t>
-            </a:r>
-            <a:r>
-              <a:rPr lang="de-DE" dirty="0"/>
-              <a:t>mitgenommen haben </a:t>
-            </a:r>
-            <a:r>
-              <a:rPr lang="de-DE" dirty="0" smtClean="0"/>
-              <a:t>sollten</a:t>
-            </a:r>
-            <a:endParaRPr lang="de-DE" dirty="0"/>
-          </a:p>
-        </p:txBody>
-      </p:sp>
-      <p:sp>
-        <p:nvSpPr>
           <p:cNvPr id="576518" name="Rectangle 5"/>
           <p:cNvSpPr>
             <a:spLocks noGrp="1" noChangeArrowheads="1"/>
@@ -30790,7 +31140,15 @@
             <a:pPr marL="419100" indent="-419100"/>
             <a:r>
               <a:rPr lang="de-DE" dirty="0"/>
-              <a:t>Welche Kriterien gibt es mit denen ich potentielle Klassen identifizieren kann?</a:t>
+              <a:t>Welche Kriterien gibt </a:t>
+            </a:r>
+            <a:r>
+              <a:rPr lang="de-DE" dirty="0" smtClean="0"/>
+              <a:t>es, </a:t>
+            </a:r>
+            <a:r>
+              <a:rPr lang="de-DE" dirty="0"/>
+              <a:t>mit denen ich potentielle Klassen identifizieren kann?</a:t>
             </a:r>
           </a:p>
           <a:p>
@@ -30840,8 +31198,20 @@
             </a:r>
             <a:r>
               <a:rPr lang="de-DE" dirty="0"/>
-              <a:t> von Verantwortlichkeiten Hierarchien verbessern?</a:t>
-            </a:r>
+              <a:t> von Verantwortlichkeiten Hierarchien verbessern</a:t>
+            </a:r>
+            <a:r>
+              <a:rPr lang="de-DE" dirty="0" smtClean="0"/>
+              <a:t>?</a:t>
+            </a:r>
+          </a:p>
+          <a:p>
+            <a:pPr marL="419100" indent="-419100"/>
+            <a:r>
+              <a:rPr lang="de-DE" dirty="0" smtClean="0"/>
+              <a:t>Leiten Sie aus einer Anforderungsbeschreibung Klassen, Verantwortlichkeiten und Kollaborationen ab</a:t>
+            </a:r>
+            <a:endParaRPr lang="de-DE" dirty="0"/>
           </a:p>
         </p:txBody>
       </p:sp>
@@ -30886,11 +31256,55 @@
           </a:p>
         </p:txBody>
       </p:sp>
+      <p:sp>
+        <p:nvSpPr>
+          <p:cNvPr id="576517" name="Rectangle 4"/>
+          <p:cNvSpPr>
+            <a:spLocks noGrp="1" noChangeArrowheads="1"/>
+          </p:cNvSpPr>
+          <p:nvPr>
+            <p:ph type="title"/>
+          </p:nvPr>
+        </p:nvSpPr>
+        <p:spPr/>
+        <p:txBody>
+          <a:bodyPr vert="horz" lIns="0" tIns="0" rIns="0" bIns="0" rtlCol="0" anchor="ctr">
+            <a:noAutofit/>
+          </a:bodyPr>
+          <a:lstStyle/>
+          <a:p>
+            <a:r>
+              <a:rPr lang="de-DE" dirty="0"/>
+              <a:t>Was </a:t>
+            </a:r>
+            <a:r>
+              <a:rPr lang="de-DE" dirty="0" smtClean="0"/>
+              <a:t>Sie </a:t>
+            </a:r>
+            <a:r>
+              <a:rPr lang="de-DE" dirty="0"/>
+              <a:t>mitgenommen haben </a:t>
+            </a:r>
+            <a:r>
+              <a:rPr lang="de-DE" dirty="0" smtClean="0"/>
+              <a:t>sollten</a:t>
+            </a:r>
+            <a:endParaRPr lang="de-DE" dirty="0"/>
+          </a:p>
+        </p:txBody>
+      </p:sp>
     </p:spTree>
   </p:cSld>
   <p:clrMapOvr>
     <a:masterClrMapping/>
   </p:clrMapOvr>
+  <p:timing>
+    <p:tnLst>
+      <p:par>
+        <p:cTn id="1" dur="indefinite" restart="never" nodeType="tmRoot"/>
+      </p:par>
+    </p:tnLst>
+  </p:timing>
 </p:sld>
 </file>
 
@@ -31409,6 +31823,13 @@
   <p:clrMapOvr>
     <a:masterClrMapping/>
   </p:clrMapOvr>
+  <p:timing>
+    <p:tnLst>
+      <p:par>
+        <p:cTn id="1" dur="indefinite" restart="never" nodeType="tmRoot"/>
+      </p:par>
+    </p:tnLst>
+  </p:timing>
 </p:sld>
 </file>
 

</xml_diff>